<commit_message>
update the C++ doc
</commit_message>
<xml_diff>
--- a/5.C++/std_function/C++ 函数包装器function.pptx
+++ b/5.C++/std_function/C++ 函数包装器function.pptx
@@ -1,28 +1,32 @@
 
 <file path=ppt/presentation.xml><?xml version="1.0" encoding="utf-8"?>
-<p:presentation xmlns:a="http://schemas.openxmlformats.org/drawingml/2006/main" xmlns:r="http://schemas.openxmlformats.org/officeDocument/2006/relationships" xmlns:p="http://schemas.openxmlformats.org/presentationml/2006/main" saveSubsetFonts="1">
+<p:presentation xmlns:a="http://schemas.openxmlformats.org/drawingml/2006/main" xmlns:r="http://schemas.openxmlformats.org/officeDocument/2006/relationships" xmlns:p="http://schemas.openxmlformats.org/presentationml/2006/main">
   <p:sldMasterIdLst>
     <p:sldMasterId id="2147483648" r:id="rId1"/>
   </p:sldMasterIdLst>
   <p:notesMasterIdLst>
-    <p:notesMasterId r:id="rId14"/>
+    <p:notesMasterId r:id="rId6"/>
   </p:notesMasterIdLst>
   <p:sldIdLst>
-    <p:sldId id="267" r:id="rId2"/>
-    <p:sldId id="256" r:id="rId3"/>
-    <p:sldId id="257" r:id="rId4"/>
-    <p:sldId id="258" r:id="rId5"/>
-    <p:sldId id="259" r:id="rId6"/>
-    <p:sldId id="260" r:id="rId7"/>
-    <p:sldId id="261" r:id="rId8"/>
-    <p:sldId id="262" r:id="rId9"/>
-    <p:sldId id="263" r:id="rId10"/>
-    <p:sldId id="264" r:id="rId11"/>
-    <p:sldId id="265" r:id="rId12"/>
-    <p:sldId id="266" r:id="rId13"/>
+    <p:sldId id="267" r:id="rId3"/>
+    <p:sldId id="279" r:id="rId4"/>
+    <p:sldId id="256" r:id="rId5"/>
+    <p:sldId id="257" r:id="rId7"/>
+    <p:sldId id="258" r:id="rId8"/>
+    <p:sldId id="259" r:id="rId9"/>
+    <p:sldId id="260" r:id="rId10"/>
+    <p:sldId id="261" r:id="rId11"/>
+    <p:sldId id="262" r:id="rId12"/>
+    <p:sldId id="263" r:id="rId13"/>
+    <p:sldId id="264" r:id="rId14"/>
+    <p:sldId id="265" r:id="rId15"/>
+    <p:sldId id="266" r:id="rId16"/>
   </p:sldIdLst>
   <p:sldSz cx="12192000" cy="6858000"/>
   <p:notesSz cx="6858000" cy="9144000"/>
+  <p:custDataLst>
+    <p:tags r:id="rId20"/>
+  </p:custDataLst>
   <p:defaultTextStyle>
     <a:defPPr>
       <a:defRPr lang="zh-CN"/>
@@ -118,11 +122,6 @@
       </a:defRPr>
     </a:lvl9pPr>
   </p:defaultTextStyle>
-  <p:extLst>
-    <p:ext uri="{EFAFB233-063F-42B5-8137-9DF3F51BA10A}">
-      <p15:sldGuideLst xmlns:p15="http://schemas.microsoft.com/office/powerpoint/2012/main"/>
-    </p:ext>
-  </p:extLst>
 </p:presentation>
 </file>
 
@@ -208,7 +207,6 @@
           <a:p>
             <a:fld id="{91CDAD44-6A3D-458A-81D9-74B125B639F1}" type="datetimeFigureOut">
               <a:rPr lang="zh-CN" altLang="en-US" smtClean="0"/>
-              <a:t>2022/5/23</a:t>
             </a:fld>
             <a:endParaRPr lang="zh-CN" altLang="en-US"/>
           </a:p>
@@ -275,6 +273,7 @@
               <a:rPr lang="zh-CN" altLang="en-US"/>
               <a:t>单击此处编辑母版文本样式</a:t>
             </a:r>
+            <a:endParaRPr lang="zh-CN" altLang="en-US"/>
           </a:p>
           <a:p>
             <a:pPr lvl="1"/>
@@ -282,6 +281,7 @@
               <a:rPr lang="zh-CN" altLang="en-US"/>
               <a:t>二级</a:t>
             </a:r>
+            <a:endParaRPr lang="zh-CN" altLang="en-US"/>
           </a:p>
           <a:p>
             <a:pPr lvl="2"/>
@@ -289,6 +289,7 @@
               <a:rPr lang="zh-CN" altLang="en-US"/>
               <a:t>三级</a:t>
             </a:r>
+            <a:endParaRPr lang="zh-CN" altLang="en-US"/>
           </a:p>
           <a:p>
             <a:pPr lvl="3"/>
@@ -296,6 +297,7 @@
               <a:rPr lang="zh-CN" altLang="en-US"/>
               <a:t>四级</a:t>
             </a:r>
+            <a:endParaRPr lang="zh-CN" altLang="en-US"/>
           </a:p>
           <a:p>
             <a:pPr lvl="4"/>
@@ -303,6 +305,7 @@
               <a:rPr lang="zh-CN" altLang="en-US"/>
               <a:t>五级</a:t>
             </a:r>
+            <a:endParaRPr lang="zh-CN" altLang="en-US"/>
           </a:p>
         </p:txBody>
       </p:sp>
@@ -366,18 +369,12 @@
           <a:p>
             <a:fld id="{EF627FA7-D050-4559-9F42-632444D2C4F3}" type="slidenum">
               <a:rPr lang="zh-CN" altLang="en-US" smtClean="0"/>
-              <a:t>‹#›</a:t>
             </a:fld>
             <a:endParaRPr lang="zh-CN" altLang="en-US"/>
           </a:p>
         </p:txBody>
       </p:sp>
     </p:spTree>
-    <p:extLst>
-      <p:ext uri="{BB962C8B-B14F-4D97-AF65-F5344CB8AC3E}">
-        <p14:creationId xmlns:p14="http://schemas.microsoft.com/office/powerpoint/2010/main" val="1137786401"/>
-      </p:ext>
-    </p:extLst>
   </p:cSld>
   <p:clrMap bg1="lt1" tx1="dk1" bg2="lt2" tx2="dk2" accent1="accent1" accent2="accent2" accent3="accent3" accent4="accent4" accent5="accent5" accent6="accent6" hlink="hlink" folHlink="folHlink"/>
   <p:notesStyle>
@@ -540,18 +537,12 @@
           <a:p>
             <a:fld id="{EF627FA7-D050-4559-9F42-632444D2C4F3}" type="slidenum">
               <a:rPr lang="zh-CN" altLang="en-US" smtClean="0"/>
-              <a:t>2</a:t>
             </a:fld>
             <a:endParaRPr lang="zh-CN" altLang="en-US"/>
           </a:p>
         </p:txBody>
       </p:sp>
     </p:spTree>
-    <p:extLst>
-      <p:ext uri="{BB962C8B-B14F-4D97-AF65-F5344CB8AC3E}">
-        <p14:creationId xmlns:p14="http://schemas.microsoft.com/office/powerpoint/2010/main" val="1269916971"/>
-      </p:ext>
-    </p:extLst>
   </p:cSld>
   <p:clrMapOvr>
     <a:masterClrMapping/>
@@ -578,13 +569,7 @@
       </p:grpSpPr>
       <p:sp>
         <p:nvSpPr>
-          <p:cNvPr id="2" name="标题 1">
-            <a:extLst>
-              <a:ext uri="{FF2B5EF4-FFF2-40B4-BE49-F238E27FC236}">
-                <a16:creationId xmlns:a16="http://schemas.microsoft.com/office/drawing/2014/main" id="{6391476C-DC3D-0EE6-65B3-D09A7609AD89}"/>
-              </a:ext>
-            </a:extLst>
-          </p:cNvPr>
+          <p:cNvPr id="2" name="标题 1"/>
           <p:cNvSpPr>
             <a:spLocks noGrp="1"/>
           </p:cNvSpPr>
@@ -610,18 +595,13 @@
               <a:rPr lang="zh-CN" altLang="en-US"/>
               <a:t>单击此处编辑母版标题样式</a:t>
             </a:r>
-          </a:p>
-        </p:txBody>
-      </p:sp>
-      <p:sp>
-        <p:nvSpPr>
-          <p:cNvPr id="3" name="副标题 2">
-            <a:extLst>
-              <a:ext uri="{FF2B5EF4-FFF2-40B4-BE49-F238E27FC236}">
-                <a16:creationId xmlns:a16="http://schemas.microsoft.com/office/drawing/2014/main" id="{30DBD220-C433-9E30-9389-B8E2E4CB3392}"/>
-              </a:ext>
-            </a:extLst>
-          </p:cNvPr>
+            <a:endParaRPr lang="zh-CN" altLang="en-US"/>
+          </a:p>
+        </p:txBody>
+      </p:sp>
+      <p:sp>
+        <p:nvSpPr>
+          <p:cNvPr id="3" name="副标题 2"/>
           <p:cNvSpPr>
             <a:spLocks noGrp="1"/>
           </p:cNvSpPr>
@@ -680,18 +660,13 @@
               <a:rPr lang="zh-CN" altLang="en-US"/>
               <a:t>单击此处编辑母版副标题样式</a:t>
             </a:r>
-          </a:p>
-        </p:txBody>
-      </p:sp>
-      <p:sp>
-        <p:nvSpPr>
-          <p:cNvPr id="4" name="日期占位符 3">
-            <a:extLst>
-              <a:ext uri="{FF2B5EF4-FFF2-40B4-BE49-F238E27FC236}">
-                <a16:creationId xmlns:a16="http://schemas.microsoft.com/office/drawing/2014/main" id="{7B48A72A-BB82-595F-84BE-88956D228504}"/>
-              </a:ext>
-            </a:extLst>
-          </p:cNvPr>
+            <a:endParaRPr lang="zh-CN" altLang="en-US"/>
+          </a:p>
+        </p:txBody>
+      </p:sp>
+      <p:sp>
+        <p:nvSpPr>
+          <p:cNvPr id="4" name="日期占位符 3"/>
           <p:cNvSpPr>
             <a:spLocks noGrp="1"/>
           </p:cNvSpPr>
@@ -706,7 +681,6 @@
           <a:p>
             <a:fld id="{543585D4-02EC-47AF-960D-820FB9B3BEF7}" type="datetimeFigureOut">
               <a:rPr lang="zh-CN" altLang="en-US" smtClean="0"/>
-              <a:t>2022/5/23</a:t>
             </a:fld>
             <a:endParaRPr lang="zh-CN" altLang="en-US"/>
           </a:p>
@@ -714,13 +688,7 @@
       </p:sp>
       <p:sp>
         <p:nvSpPr>
-          <p:cNvPr id="5" name="页脚占位符 4">
-            <a:extLst>
-              <a:ext uri="{FF2B5EF4-FFF2-40B4-BE49-F238E27FC236}">
-                <a16:creationId xmlns:a16="http://schemas.microsoft.com/office/drawing/2014/main" id="{99DFF67E-5808-9D64-F42F-67413DF8C1A5}"/>
-              </a:ext>
-            </a:extLst>
-          </p:cNvPr>
+          <p:cNvPr id="5" name="页脚占位符 4"/>
           <p:cNvSpPr>
             <a:spLocks noGrp="1"/>
           </p:cNvSpPr>
@@ -739,13 +707,7 @@
       </p:sp>
       <p:sp>
         <p:nvSpPr>
-          <p:cNvPr id="6" name="灯片编号占位符 5">
-            <a:extLst>
-              <a:ext uri="{FF2B5EF4-FFF2-40B4-BE49-F238E27FC236}">
-                <a16:creationId xmlns:a16="http://schemas.microsoft.com/office/drawing/2014/main" id="{A0E0D843-3522-7EBB-7EBE-902E1FA5A143}"/>
-              </a:ext>
-            </a:extLst>
-          </p:cNvPr>
+          <p:cNvPr id="6" name="灯片编号占位符 5"/>
           <p:cNvSpPr>
             <a:spLocks noGrp="1"/>
           </p:cNvSpPr>
@@ -760,18 +722,12 @@
           <a:p>
             <a:fld id="{EA8DA225-941F-41DD-A69A-AB4863F4F7BA}" type="slidenum">
               <a:rPr lang="zh-CN" altLang="en-US" smtClean="0"/>
-              <a:t>‹#›</a:t>
             </a:fld>
             <a:endParaRPr lang="zh-CN" altLang="en-US"/>
           </a:p>
         </p:txBody>
       </p:sp>
     </p:spTree>
-    <p:extLst>
-      <p:ext uri="{BB962C8B-B14F-4D97-AF65-F5344CB8AC3E}">
-        <p14:creationId xmlns:p14="http://schemas.microsoft.com/office/powerpoint/2010/main" val="2234219767"/>
-      </p:ext>
-    </p:extLst>
   </p:cSld>
   <p:clrMapOvr>
     <a:masterClrMapping/>
@@ -798,13 +754,7 @@
       </p:grpSpPr>
       <p:sp>
         <p:nvSpPr>
-          <p:cNvPr id="2" name="标题 1">
-            <a:extLst>
-              <a:ext uri="{FF2B5EF4-FFF2-40B4-BE49-F238E27FC236}">
-                <a16:creationId xmlns:a16="http://schemas.microsoft.com/office/drawing/2014/main" id="{6296A0F6-288B-5626-8BCB-2A6A07856812}"/>
-              </a:ext>
-            </a:extLst>
-          </p:cNvPr>
+          <p:cNvPr id="2" name="标题 1"/>
           <p:cNvSpPr>
             <a:spLocks noGrp="1"/>
           </p:cNvSpPr>
@@ -821,18 +771,13 @@
               <a:rPr lang="zh-CN" altLang="en-US"/>
               <a:t>单击此处编辑母版标题样式</a:t>
             </a:r>
-          </a:p>
-        </p:txBody>
-      </p:sp>
-      <p:sp>
-        <p:nvSpPr>
-          <p:cNvPr id="3" name="竖排文字占位符 2">
-            <a:extLst>
-              <a:ext uri="{FF2B5EF4-FFF2-40B4-BE49-F238E27FC236}">
-                <a16:creationId xmlns:a16="http://schemas.microsoft.com/office/drawing/2014/main" id="{B641E4C7-93DA-5655-2F15-46A118455634}"/>
-              </a:ext>
-            </a:extLst>
-          </p:cNvPr>
+            <a:endParaRPr lang="zh-CN" altLang="en-US"/>
+          </a:p>
+        </p:txBody>
+      </p:sp>
+      <p:sp>
+        <p:nvSpPr>
+          <p:cNvPr id="3" name="竖排文字占位符 2"/>
           <p:cNvSpPr>
             <a:spLocks noGrp="1"/>
           </p:cNvSpPr>
@@ -850,6 +795,7 @@
               <a:rPr lang="zh-CN" altLang="en-US"/>
               <a:t>单击此处编辑母版文本样式</a:t>
             </a:r>
+            <a:endParaRPr lang="zh-CN" altLang="en-US"/>
           </a:p>
           <a:p>
             <a:pPr lvl="1"/>
@@ -857,6 +803,7 @@
               <a:rPr lang="zh-CN" altLang="en-US"/>
               <a:t>二级</a:t>
             </a:r>
+            <a:endParaRPr lang="zh-CN" altLang="en-US"/>
           </a:p>
           <a:p>
             <a:pPr lvl="2"/>
@@ -864,6 +811,7 @@
               <a:rPr lang="zh-CN" altLang="en-US"/>
               <a:t>三级</a:t>
             </a:r>
+            <a:endParaRPr lang="zh-CN" altLang="en-US"/>
           </a:p>
           <a:p>
             <a:pPr lvl="3"/>
@@ -871,6 +819,7 @@
               <a:rPr lang="zh-CN" altLang="en-US"/>
               <a:t>四级</a:t>
             </a:r>
+            <a:endParaRPr lang="zh-CN" altLang="en-US"/>
           </a:p>
           <a:p>
             <a:pPr lvl="4"/>
@@ -878,18 +827,13 @@
               <a:rPr lang="zh-CN" altLang="en-US"/>
               <a:t>五级</a:t>
             </a:r>
-          </a:p>
-        </p:txBody>
-      </p:sp>
-      <p:sp>
-        <p:nvSpPr>
-          <p:cNvPr id="4" name="日期占位符 3">
-            <a:extLst>
-              <a:ext uri="{FF2B5EF4-FFF2-40B4-BE49-F238E27FC236}">
-                <a16:creationId xmlns:a16="http://schemas.microsoft.com/office/drawing/2014/main" id="{1AB399D2-069A-3AA7-30D3-D1DFF7547494}"/>
-              </a:ext>
-            </a:extLst>
-          </p:cNvPr>
+            <a:endParaRPr lang="zh-CN" altLang="en-US"/>
+          </a:p>
+        </p:txBody>
+      </p:sp>
+      <p:sp>
+        <p:nvSpPr>
+          <p:cNvPr id="4" name="日期占位符 3"/>
           <p:cNvSpPr>
             <a:spLocks noGrp="1"/>
           </p:cNvSpPr>
@@ -904,7 +848,6 @@
           <a:p>
             <a:fld id="{543585D4-02EC-47AF-960D-820FB9B3BEF7}" type="datetimeFigureOut">
               <a:rPr lang="zh-CN" altLang="en-US" smtClean="0"/>
-              <a:t>2022/5/23</a:t>
             </a:fld>
             <a:endParaRPr lang="zh-CN" altLang="en-US"/>
           </a:p>
@@ -912,13 +855,7 @@
       </p:sp>
       <p:sp>
         <p:nvSpPr>
-          <p:cNvPr id="5" name="页脚占位符 4">
-            <a:extLst>
-              <a:ext uri="{FF2B5EF4-FFF2-40B4-BE49-F238E27FC236}">
-                <a16:creationId xmlns:a16="http://schemas.microsoft.com/office/drawing/2014/main" id="{DE640BD7-F75C-C45D-1897-E647D16F8399}"/>
-              </a:ext>
-            </a:extLst>
-          </p:cNvPr>
+          <p:cNvPr id="5" name="页脚占位符 4"/>
           <p:cNvSpPr>
             <a:spLocks noGrp="1"/>
           </p:cNvSpPr>
@@ -937,13 +874,7 @@
       </p:sp>
       <p:sp>
         <p:nvSpPr>
-          <p:cNvPr id="6" name="灯片编号占位符 5">
-            <a:extLst>
-              <a:ext uri="{FF2B5EF4-FFF2-40B4-BE49-F238E27FC236}">
-                <a16:creationId xmlns:a16="http://schemas.microsoft.com/office/drawing/2014/main" id="{A7A60EA6-C883-40AF-9E8B-6149785C3A03}"/>
-              </a:ext>
-            </a:extLst>
-          </p:cNvPr>
+          <p:cNvPr id="6" name="灯片编号占位符 5"/>
           <p:cNvSpPr>
             <a:spLocks noGrp="1"/>
           </p:cNvSpPr>
@@ -958,18 +889,12 @@
           <a:p>
             <a:fld id="{EA8DA225-941F-41DD-A69A-AB4863F4F7BA}" type="slidenum">
               <a:rPr lang="zh-CN" altLang="en-US" smtClean="0"/>
-              <a:t>‹#›</a:t>
             </a:fld>
             <a:endParaRPr lang="zh-CN" altLang="en-US"/>
           </a:p>
         </p:txBody>
       </p:sp>
     </p:spTree>
-    <p:extLst>
-      <p:ext uri="{BB962C8B-B14F-4D97-AF65-F5344CB8AC3E}">
-        <p14:creationId xmlns:p14="http://schemas.microsoft.com/office/powerpoint/2010/main" val="3177288793"/>
-      </p:ext>
-    </p:extLst>
   </p:cSld>
   <p:clrMapOvr>
     <a:masterClrMapping/>
@@ -996,13 +921,7 @@
       </p:grpSpPr>
       <p:sp>
         <p:nvSpPr>
-          <p:cNvPr id="2" name="竖排标题 1">
-            <a:extLst>
-              <a:ext uri="{FF2B5EF4-FFF2-40B4-BE49-F238E27FC236}">
-                <a16:creationId xmlns:a16="http://schemas.microsoft.com/office/drawing/2014/main" id="{280841D4-4EE0-8803-F378-72E9C38AA3EF}"/>
-              </a:ext>
-            </a:extLst>
-          </p:cNvPr>
+          <p:cNvPr id="2" name="竖排标题 1"/>
           <p:cNvSpPr>
             <a:spLocks noGrp="1"/>
           </p:cNvSpPr>
@@ -1024,18 +943,13 @@
               <a:rPr lang="zh-CN" altLang="en-US"/>
               <a:t>单击此处编辑母版标题样式</a:t>
             </a:r>
-          </a:p>
-        </p:txBody>
-      </p:sp>
-      <p:sp>
-        <p:nvSpPr>
-          <p:cNvPr id="3" name="竖排文字占位符 2">
-            <a:extLst>
-              <a:ext uri="{FF2B5EF4-FFF2-40B4-BE49-F238E27FC236}">
-                <a16:creationId xmlns:a16="http://schemas.microsoft.com/office/drawing/2014/main" id="{7039AF37-05FF-9190-610E-C5E034524B5C}"/>
-              </a:ext>
-            </a:extLst>
-          </p:cNvPr>
+            <a:endParaRPr lang="zh-CN" altLang="en-US"/>
+          </a:p>
+        </p:txBody>
+      </p:sp>
+      <p:sp>
+        <p:nvSpPr>
+          <p:cNvPr id="3" name="竖排文字占位符 2"/>
           <p:cNvSpPr>
             <a:spLocks noGrp="1"/>
           </p:cNvSpPr>
@@ -1058,6 +972,7 @@
               <a:rPr lang="zh-CN" altLang="en-US"/>
               <a:t>单击此处编辑母版文本样式</a:t>
             </a:r>
+            <a:endParaRPr lang="zh-CN" altLang="en-US"/>
           </a:p>
           <a:p>
             <a:pPr lvl="1"/>
@@ -1065,6 +980,7 @@
               <a:rPr lang="zh-CN" altLang="en-US"/>
               <a:t>二级</a:t>
             </a:r>
+            <a:endParaRPr lang="zh-CN" altLang="en-US"/>
           </a:p>
           <a:p>
             <a:pPr lvl="2"/>
@@ -1072,6 +988,7 @@
               <a:rPr lang="zh-CN" altLang="en-US"/>
               <a:t>三级</a:t>
             </a:r>
+            <a:endParaRPr lang="zh-CN" altLang="en-US"/>
           </a:p>
           <a:p>
             <a:pPr lvl="3"/>
@@ -1079,6 +996,7 @@
               <a:rPr lang="zh-CN" altLang="en-US"/>
               <a:t>四级</a:t>
             </a:r>
+            <a:endParaRPr lang="zh-CN" altLang="en-US"/>
           </a:p>
           <a:p>
             <a:pPr lvl="4"/>
@@ -1086,18 +1004,13 @@
               <a:rPr lang="zh-CN" altLang="en-US"/>
               <a:t>五级</a:t>
             </a:r>
-          </a:p>
-        </p:txBody>
-      </p:sp>
-      <p:sp>
-        <p:nvSpPr>
-          <p:cNvPr id="4" name="日期占位符 3">
-            <a:extLst>
-              <a:ext uri="{FF2B5EF4-FFF2-40B4-BE49-F238E27FC236}">
-                <a16:creationId xmlns:a16="http://schemas.microsoft.com/office/drawing/2014/main" id="{D7FE51F3-4BF0-61D8-D433-41BFF757843E}"/>
-              </a:ext>
-            </a:extLst>
-          </p:cNvPr>
+            <a:endParaRPr lang="zh-CN" altLang="en-US"/>
+          </a:p>
+        </p:txBody>
+      </p:sp>
+      <p:sp>
+        <p:nvSpPr>
+          <p:cNvPr id="4" name="日期占位符 3"/>
           <p:cNvSpPr>
             <a:spLocks noGrp="1"/>
           </p:cNvSpPr>
@@ -1112,7 +1025,6 @@
           <a:p>
             <a:fld id="{543585D4-02EC-47AF-960D-820FB9B3BEF7}" type="datetimeFigureOut">
               <a:rPr lang="zh-CN" altLang="en-US" smtClean="0"/>
-              <a:t>2022/5/23</a:t>
             </a:fld>
             <a:endParaRPr lang="zh-CN" altLang="en-US"/>
           </a:p>
@@ -1120,13 +1032,7 @@
       </p:sp>
       <p:sp>
         <p:nvSpPr>
-          <p:cNvPr id="5" name="页脚占位符 4">
-            <a:extLst>
-              <a:ext uri="{FF2B5EF4-FFF2-40B4-BE49-F238E27FC236}">
-                <a16:creationId xmlns:a16="http://schemas.microsoft.com/office/drawing/2014/main" id="{E9FD5976-585D-027F-5E61-56F359AF6A03}"/>
-              </a:ext>
-            </a:extLst>
-          </p:cNvPr>
+          <p:cNvPr id="5" name="页脚占位符 4"/>
           <p:cNvSpPr>
             <a:spLocks noGrp="1"/>
           </p:cNvSpPr>
@@ -1145,13 +1051,7 @@
       </p:sp>
       <p:sp>
         <p:nvSpPr>
-          <p:cNvPr id="6" name="灯片编号占位符 5">
-            <a:extLst>
-              <a:ext uri="{FF2B5EF4-FFF2-40B4-BE49-F238E27FC236}">
-                <a16:creationId xmlns:a16="http://schemas.microsoft.com/office/drawing/2014/main" id="{436F4B60-401F-BB94-B3B7-2C3E6C0674E3}"/>
-              </a:ext>
-            </a:extLst>
-          </p:cNvPr>
+          <p:cNvPr id="6" name="灯片编号占位符 5"/>
           <p:cNvSpPr>
             <a:spLocks noGrp="1"/>
           </p:cNvSpPr>
@@ -1166,18 +1066,12 @@
           <a:p>
             <a:fld id="{EA8DA225-941F-41DD-A69A-AB4863F4F7BA}" type="slidenum">
               <a:rPr lang="zh-CN" altLang="en-US" smtClean="0"/>
-              <a:t>‹#›</a:t>
             </a:fld>
             <a:endParaRPr lang="zh-CN" altLang="en-US"/>
           </a:p>
         </p:txBody>
       </p:sp>
     </p:spTree>
-    <p:extLst>
-      <p:ext uri="{BB962C8B-B14F-4D97-AF65-F5344CB8AC3E}">
-        <p14:creationId xmlns:p14="http://schemas.microsoft.com/office/powerpoint/2010/main" val="1777045270"/>
-      </p:ext>
-    </p:extLst>
   </p:cSld>
   <p:clrMapOvr>
     <a:masterClrMapping/>
@@ -1204,13 +1098,7 @@
       </p:grpSpPr>
       <p:sp>
         <p:nvSpPr>
-          <p:cNvPr id="2" name="标题 1">
-            <a:extLst>
-              <a:ext uri="{FF2B5EF4-FFF2-40B4-BE49-F238E27FC236}">
-                <a16:creationId xmlns:a16="http://schemas.microsoft.com/office/drawing/2014/main" id="{5A684E4B-004E-43D4-FEAD-D81884B24866}"/>
-              </a:ext>
-            </a:extLst>
-          </p:cNvPr>
+          <p:cNvPr id="2" name="标题 1"/>
           <p:cNvSpPr>
             <a:spLocks noGrp="1"/>
           </p:cNvSpPr>
@@ -1227,18 +1115,13 @@
               <a:rPr lang="zh-CN" altLang="en-US"/>
               <a:t>单击此处编辑母版标题样式</a:t>
             </a:r>
-          </a:p>
-        </p:txBody>
-      </p:sp>
-      <p:sp>
-        <p:nvSpPr>
-          <p:cNvPr id="3" name="内容占位符 2">
-            <a:extLst>
-              <a:ext uri="{FF2B5EF4-FFF2-40B4-BE49-F238E27FC236}">
-                <a16:creationId xmlns:a16="http://schemas.microsoft.com/office/drawing/2014/main" id="{D793EABB-CC15-2D77-56EE-2C7DDFA22097}"/>
-              </a:ext>
-            </a:extLst>
-          </p:cNvPr>
+            <a:endParaRPr lang="zh-CN" altLang="en-US"/>
+          </a:p>
+        </p:txBody>
+      </p:sp>
+      <p:sp>
+        <p:nvSpPr>
+          <p:cNvPr id="3" name="内容占位符 2"/>
           <p:cNvSpPr>
             <a:spLocks noGrp="1"/>
           </p:cNvSpPr>
@@ -1256,6 +1139,7 @@
               <a:rPr lang="zh-CN" altLang="en-US"/>
               <a:t>单击此处编辑母版文本样式</a:t>
             </a:r>
+            <a:endParaRPr lang="zh-CN" altLang="en-US"/>
           </a:p>
           <a:p>
             <a:pPr lvl="1"/>
@@ -1263,6 +1147,7 @@
               <a:rPr lang="zh-CN" altLang="en-US"/>
               <a:t>二级</a:t>
             </a:r>
+            <a:endParaRPr lang="zh-CN" altLang="en-US"/>
           </a:p>
           <a:p>
             <a:pPr lvl="2"/>
@@ -1270,6 +1155,7 @@
               <a:rPr lang="zh-CN" altLang="en-US"/>
               <a:t>三级</a:t>
             </a:r>
+            <a:endParaRPr lang="zh-CN" altLang="en-US"/>
           </a:p>
           <a:p>
             <a:pPr lvl="3"/>
@@ -1277,6 +1163,7 @@
               <a:rPr lang="zh-CN" altLang="en-US"/>
               <a:t>四级</a:t>
             </a:r>
+            <a:endParaRPr lang="zh-CN" altLang="en-US"/>
           </a:p>
           <a:p>
             <a:pPr lvl="4"/>
@@ -1284,18 +1171,13 @@
               <a:rPr lang="zh-CN" altLang="en-US"/>
               <a:t>五级</a:t>
             </a:r>
-          </a:p>
-        </p:txBody>
-      </p:sp>
-      <p:sp>
-        <p:nvSpPr>
-          <p:cNvPr id="4" name="日期占位符 3">
-            <a:extLst>
-              <a:ext uri="{FF2B5EF4-FFF2-40B4-BE49-F238E27FC236}">
-                <a16:creationId xmlns:a16="http://schemas.microsoft.com/office/drawing/2014/main" id="{B6772FDA-F4CA-C102-7783-D0AA8A7CA6B0}"/>
-              </a:ext>
-            </a:extLst>
-          </p:cNvPr>
+            <a:endParaRPr lang="zh-CN" altLang="en-US"/>
+          </a:p>
+        </p:txBody>
+      </p:sp>
+      <p:sp>
+        <p:nvSpPr>
+          <p:cNvPr id="4" name="日期占位符 3"/>
           <p:cNvSpPr>
             <a:spLocks noGrp="1"/>
           </p:cNvSpPr>
@@ -1310,7 +1192,6 @@
           <a:p>
             <a:fld id="{543585D4-02EC-47AF-960D-820FB9B3BEF7}" type="datetimeFigureOut">
               <a:rPr lang="zh-CN" altLang="en-US" smtClean="0"/>
-              <a:t>2022/5/23</a:t>
             </a:fld>
             <a:endParaRPr lang="zh-CN" altLang="en-US"/>
           </a:p>
@@ -1318,13 +1199,7 @@
       </p:sp>
       <p:sp>
         <p:nvSpPr>
-          <p:cNvPr id="5" name="页脚占位符 4">
-            <a:extLst>
-              <a:ext uri="{FF2B5EF4-FFF2-40B4-BE49-F238E27FC236}">
-                <a16:creationId xmlns:a16="http://schemas.microsoft.com/office/drawing/2014/main" id="{A426D7BE-5701-2B4E-1F35-A233F8B0D2BE}"/>
-              </a:ext>
-            </a:extLst>
-          </p:cNvPr>
+          <p:cNvPr id="5" name="页脚占位符 4"/>
           <p:cNvSpPr>
             <a:spLocks noGrp="1"/>
           </p:cNvSpPr>
@@ -1343,13 +1218,7 @@
       </p:sp>
       <p:sp>
         <p:nvSpPr>
-          <p:cNvPr id="6" name="灯片编号占位符 5">
-            <a:extLst>
-              <a:ext uri="{FF2B5EF4-FFF2-40B4-BE49-F238E27FC236}">
-                <a16:creationId xmlns:a16="http://schemas.microsoft.com/office/drawing/2014/main" id="{17CD156A-54F6-7D17-CAD0-206415CDABE2}"/>
-              </a:ext>
-            </a:extLst>
-          </p:cNvPr>
+          <p:cNvPr id="6" name="灯片编号占位符 5"/>
           <p:cNvSpPr>
             <a:spLocks noGrp="1"/>
           </p:cNvSpPr>
@@ -1364,18 +1233,12 @@
           <a:p>
             <a:fld id="{EA8DA225-941F-41DD-A69A-AB4863F4F7BA}" type="slidenum">
               <a:rPr lang="zh-CN" altLang="en-US" smtClean="0"/>
-              <a:t>‹#›</a:t>
             </a:fld>
             <a:endParaRPr lang="zh-CN" altLang="en-US"/>
           </a:p>
         </p:txBody>
       </p:sp>
     </p:spTree>
-    <p:extLst>
-      <p:ext uri="{BB962C8B-B14F-4D97-AF65-F5344CB8AC3E}">
-        <p14:creationId xmlns:p14="http://schemas.microsoft.com/office/powerpoint/2010/main" val="4277759429"/>
-      </p:ext>
-    </p:extLst>
   </p:cSld>
   <p:clrMapOvr>
     <a:masterClrMapping/>
@@ -1402,13 +1265,7 @@
       </p:grpSpPr>
       <p:sp>
         <p:nvSpPr>
-          <p:cNvPr id="2" name="标题 1">
-            <a:extLst>
-              <a:ext uri="{FF2B5EF4-FFF2-40B4-BE49-F238E27FC236}">
-                <a16:creationId xmlns:a16="http://schemas.microsoft.com/office/drawing/2014/main" id="{C944A6A2-D7FE-2471-7EAC-1A88C822BAD6}"/>
-              </a:ext>
-            </a:extLst>
-          </p:cNvPr>
+          <p:cNvPr id="2" name="标题 1"/>
           <p:cNvSpPr>
             <a:spLocks noGrp="1"/>
           </p:cNvSpPr>
@@ -1434,18 +1291,13 @@
               <a:rPr lang="zh-CN" altLang="en-US"/>
               <a:t>单击此处编辑母版标题样式</a:t>
             </a:r>
-          </a:p>
-        </p:txBody>
-      </p:sp>
-      <p:sp>
-        <p:nvSpPr>
-          <p:cNvPr id="3" name="文本占位符 2">
-            <a:extLst>
-              <a:ext uri="{FF2B5EF4-FFF2-40B4-BE49-F238E27FC236}">
-                <a16:creationId xmlns:a16="http://schemas.microsoft.com/office/drawing/2014/main" id="{77402EAA-BF38-6CBB-A3D8-6A7900C38F50}"/>
-              </a:ext>
-            </a:extLst>
-          </p:cNvPr>
+            <a:endParaRPr lang="zh-CN" altLang="en-US"/>
+          </a:p>
+        </p:txBody>
+      </p:sp>
+      <p:sp>
+        <p:nvSpPr>
+          <p:cNvPr id="3" name="文本占位符 2"/>
           <p:cNvSpPr>
             <a:spLocks noGrp="1"/>
           </p:cNvSpPr>
@@ -1559,18 +1411,13 @@
               <a:rPr lang="zh-CN" altLang="en-US"/>
               <a:t>单击此处编辑母版文本样式</a:t>
             </a:r>
-          </a:p>
-        </p:txBody>
-      </p:sp>
-      <p:sp>
-        <p:nvSpPr>
-          <p:cNvPr id="4" name="日期占位符 3">
-            <a:extLst>
-              <a:ext uri="{FF2B5EF4-FFF2-40B4-BE49-F238E27FC236}">
-                <a16:creationId xmlns:a16="http://schemas.microsoft.com/office/drawing/2014/main" id="{FA7E05BC-2CC8-9C84-E086-F964B0A122DE}"/>
-              </a:ext>
-            </a:extLst>
-          </p:cNvPr>
+            <a:endParaRPr lang="zh-CN" altLang="en-US"/>
+          </a:p>
+        </p:txBody>
+      </p:sp>
+      <p:sp>
+        <p:nvSpPr>
+          <p:cNvPr id="4" name="日期占位符 3"/>
           <p:cNvSpPr>
             <a:spLocks noGrp="1"/>
           </p:cNvSpPr>
@@ -1585,7 +1432,6 @@
           <a:p>
             <a:fld id="{543585D4-02EC-47AF-960D-820FB9B3BEF7}" type="datetimeFigureOut">
               <a:rPr lang="zh-CN" altLang="en-US" smtClean="0"/>
-              <a:t>2022/5/23</a:t>
             </a:fld>
             <a:endParaRPr lang="zh-CN" altLang="en-US"/>
           </a:p>
@@ -1593,13 +1439,7 @@
       </p:sp>
       <p:sp>
         <p:nvSpPr>
-          <p:cNvPr id="5" name="页脚占位符 4">
-            <a:extLst>
-              <a:ext uri="{FF2B5EF4-FFF2-40B4-BE49-F238E27FC236}">
-                <a16:creationId xmlns:a16="http://schemas.microsoft.com/office/drawing/2014/main" id="{6BAD9066-A8B9-0CA7-550D-17D37C461B0C}"/>
-              </a:ext>
-            </a:extLst>
-          </p:cNvPr>
+          <p:cNvPr id="5" name="页脚占位符 4"/>
           <p:cNvSpPr>
             <a:spLocks noGrp="1"/>
           </p:cNvSpPr>
@@ -1618,13 +1458,7 @@
       </p:sp>
       <p:sp>
         <p:nvSpPr>
-          <p:cNvPr id="6" name="灯片编号占位符 5">
-            <a:extLst>
-              <a:ext uri="{FF2B5EF4-FFF2-40B4-BE49-F238E27FC236}">
-                <a16:creationId xmlns:a16="http://schemas.microsoft.com/office/drawing/2014/main" id="{73E87452-614C-C968-EABD-C073CE13E4E8}"/>
-              </a:ext>
-            </a:extLst>
-          </p:cNvPr>
+          <p:cNvPr id="6" name="灯片编号占位符 5"/>
           <p:cNvSpPr>
             <a:spLocks noGrp="1"/>
           </p:cNvSpPr>
@@ -1639,18 +1473,12 @@
           <a:p>
             <a:fld id="{EA8DA225-941F-41DD-A69A-AB4863F4F7BA}" type="slidenum">
               <a:rPr lang="zh-CN" altLang="en-US" smtClean="0"/>
-              <a:t>‹#›</a:t>
             </a:fld>
             <a:endParaRPr lang="zh-CN" altLang="en-US"/>
           </a:p>
         </p:txBody>
       </p:sp>
     </p:spTree>
-    <p:extLst>
-      <p:ext uri="{BB962C8B-B14F-4D97-AF65-F5344CB8AC3E}">
-        <p14:creationId xmlns:p14="http://schemas.microsoft.com/office/powerpoint/2010/main" val="2679366213"/>
-      </p:ext>
-    </p:extLst>
   </p:cSld>
   <p:clrMapOvr>
     <a:masterClrMapping/>
@@ -1677,13 +1505,7 @@
       </p:grpSpPr>
       <p:sp>
         <p:nvSpPr>
-          <p:cNvPr id="2" name="标题 1">
-            <a:extLst>
-              <a:ext uri="{FF2B5EF4-FFF2-40B4-BE49-F238E27FC236}">
-                <a16:creationId xmlns:a16="http://schemas.microsoft.com/office/drawing/2014/main" id="{9A613946-7CE3-EB80-C7C4-651FCBE63855}"/>
-              </a:ext>
-            </a:extLst>
-          </p:cNvPr>
+          <p:cNvPr id="2" name="标题 1"/>
           <p:cNvSpPr>
             <a:spLocks noGrp="1"/>
           </p:cNvSpPr>
@@ -1700,18 +1522,13 @@
               <a:rPr lang="zh-CN" altLang="en-US"/>
               <a:t>单击此处编辑母版标题样式</a:t>
             </a:r>
-          </a:p>
-        </p:txBody>
-      </p:sp>
-      <p:sp>
-        <p:nvSpPr>
-          <p:cNvPr id="3" name="内容占位符 2">
-            <a:extLst>
-              <a:ext uri="{FF2B5EF4-FFF2-40B4-BE49-F238E27FC236}">
-                <a16:creationId xmlns:a16="http://schemas.microsoft.com/office/drawing/2014/main" id="{B321BE62-BDAA-9FDA-CAF9-839DF2FFE4D6}"/>
-              </a:ext>
-            </a:extLst>
-          </p:cNvPr>
+            <a:endParaRPr lang="zh-CN" altLang="en-US"/>
+          </a:p>
+        </p:txBody>
+      </p:sp>
+      <p:sp>
+        <p:nvSpPr>
+          <p:cNvPr id="3" name="内容占位符 2"/>
           <p:cNvSpPr>
             <a:spLocks noGrp="1"/>
           </p:cNvSpPr>
@@ -1734,6 +1551,7 @@
               <a:rPr lang="zh-CN" altLang="en-US"/>
               <a:t>单击此处编辑母版文本样式</a:t>
             </a:r>
+            <a:endParaRPr lang="zh-CN" altLang="en-US"/>
           </a:p>
           <a:p>
             <a:pPr lvl="1"/>
@@ -1741,6 +1559,7 @@
               <a:rPr lang="zh-CN" altLang="en-US"/>
               <a:t>二级</a:t>
             </a:r>
+            <a:endParaRPr lang="zh-CN" altLang="en-US"/>
           </a:p>
           <a:p>
             <a:pPr lvl="2"/>
@@ -1748,6 +1567,7 @@
               <a:rPr lang="zh-CN" altLang="en-US"/>
               <a:t>三级</a:t>
             </a:r>
+            <a:endParaRPr lang="zh-CN" altLang="en-US"/>
           </a:p>
           <a:p>
             <a:pPr lvl="3"/>
@@ -1755,6 +1575,7 @@
               <a:rPr lang="zh-CN" altLang="en-US"/>
               <a:t>四级</a:t>
             </a:r>
+            <a:endParaRPr lang="zh-CN" altLang="en-US"/>
           </a:p>
           <a:p>
             <a:pPr lvl="4"/>
@@ -1762,18 +1583,13 @@
               <a:rPr lang="zh-CN" altLang="en-US"/>
               <a:t>五级</a:t>
             </a:r>
-          </a:p>
-        </p:txBody>
-      </p:sp>
-      <p:sp>
-        <p:nvSpPr>
-          <p:cNvPr id="4" name="内容占位符 3">
-            <a:extLst>
-              <a:ext uri="{FF2B5EF4-FFF2-40B4-BE49-F238E27FC236}">
-                <a16:creationId xmlns:a16="http://schemas.microsoft.com/office/drawing/2014/main" id="{A448292D-E126-C237-5FD4-A9132C7FA82D}"/>
-              </a:ext>
-            </a:extLst>
-          </p:cNvPr>
+            <a:endParaRPr lang="zh-CN" altLang="en-US"/>
+          </a:p>
+        </p:txBody>
+      </p:sp>
+      <p:sp>
+        <p:nvSpPr>
+          <p:cNvPr id="4" name="内容占位符 3"/>
           <p:cNvSpPr>
             <a:spLocks noGrp="1"/>
           </p:cNvSpPr>
@@ -1796,6 +1612,7 @@
               <a:rPr lang="zh-CN" altLang="en-US"/>
               <a:t>单击此处编辑母版文本样式</a:t>
             </a:r>
+            <a:endParaRPr lang="zh-CN" altLang="en-US"/>
           </a:p>
           <a:p>
             <a:pPr lvl="1"/>
@@ -1803,6 +1620,7 @@
               <a:rPr lang="zh-CN" altLang="en-US"/>
               <a:t>二级</a:t>
             </a:r>
+            <a:endParaRPr lang="zh-CN" altLang="en-US"/>
           </a:p>
           <a:p>
             <a:pPr lvl="2"/>
@@ -1810,6 +1628,7 @@
               <a:rPr lang="zh-CN" altLang="en-US"/>
               <a:t>三级</a:t>
             </a:r>
+            <a:endParaRPr lang="zh-CN" altLang="en-US"/>
           </a:p>
           <a:p>
             <a:pPr lvl="3"/>
@@ -1817,6 +1636,7 @@
               <a:rPr lang="zh-CN" altLang="en-US"/>
               <a:t>四级</a:t>
             </a:r>
+            <a:endParaRPr lang="zh-CN" altLang="en-US"/>
           </a:p>
           <a:p>
             <a:pPr lvl="4"/>
@@ -1824,18 +1644,13 @@
               <a:rPr lang="zh-CN" altLang="en-US"/>
               <a:t>五级</a:t>
             </a:r>
-          </a:p>
-        </p:txBody>
-      </p:sp>
-      <p:sp>
-        <p:nvSpPr>
-          <p:cNvPr id="5" name="日期占位符 4">
-            <a:extLst>
-              <a:ext uri="{FF2B5EF4-FFF2-40B4-BE49-F238E27FC236}">
-                <a16:creationId xmlns:a16="http://schemas.microsoft.com/office/drawing/2014/main" id="{960B3936-2F1C-189E-CCE0-C25D94F9E5CE}"/>
-              </a:ext>
-            </a:extLst>
-          </p:cNvPr>
+            <a:endParaRPr lang="zh-CN" altLang="en-US"/>
+          </a:p>
+        </p:txBody>
+      </p:sp>
+      <p:sp>
+        <p:nvSpPr>
+          <p:cNvPr id="5" name="日期占位符 4"/>
           <p:cNvSpPr>
             <a:spLocks noGrp="1"/>
           </p:cNvSpPr>
@@ -1850,7 +1665,6 @@
           <a:p>
             <a:fld id="{543585D4-02EC-47AF-960D-820FB9B3BEF7}" type="datetimeFigureOut">
               <a:rPr lang="zh-CN" altLang="en-US" smtClean="0"/>
-              <a:t>2022/5/23</a:t>
             </a:fld>
             <a:endParaRPr lang="zh-CN" altLang="en-US"/>
           </a:p>
@@ -1858,13 +1672,7 @@
       </p:sp>
       <p:sp>
         <p:nvSpPr>
-          <p:cNvPr id="6" name="页脚占位符 5">
-            <a:extLst>
-              <a:ext uri="{FF2B5EF4-FFF2-40B4-BE49-F238E27FC236}">
-                <a16:creationId xmlns:a16="http://schemas.microsoft.com/office/drawing/2014/main" id="{6953B937-B3B7-D0A4-CCD9-4DFCADD57BDE}"/>
-              </a:ext>
-            </a:extLst>
-          </p:cNvPr>
+          <p:cNvPr id="6" name="页脚占位符 5"/>
           <p:cNvSpPr>
             <a:spLocks noGrp="1"/>
           </p:cNvSpPr>
@@ -1883,13 +1691,7 @@
       </p:sp>
       <p:sp>
         <p:nvSpPr>
-          <p:cNvPr id="7" name="灯片编号占位符 6">
-            <a:extLst>
-              <a:ext uri="{FF2B5EF4-FFF2-40B4-BE49-F238E27FC236}">
-                <a16:creationId xmlns:a16="http://schemas.microsoft.com/office/drawing/2014/main" id="{0C2D8117-94E2-865E-D122-0ADB4B9A5952}"/>
-              </a:ext>
-            </a:extLst>
-          </p:cNvPr>
+          <p:cNvPr id="7" name="灯片编号占位符 6"/>
           <p:cNvSpPr>
             <a:spLocks noGrp="1"/>
           </p:cNvSpPr>
@@ -1904,18 +1706,12 @@
           <a:p>
             <a:fld id="{EA8DA225-941F-41DD-A69A-AB4863F4F7BA}" type="slidenum">
               <a:rPr lang="zh-CN" altLang="en-US" smtClean="0"/>
-              <a:t>‹#›</a:t>
             </a:fld>
             <a:endParaRPr lang="zh-CN" altLang="en-US"/>
           </a:p>
         </p:txBody>
       </p:sp>
     </p:spTree>
-    <p:extLst>
-      <p:ext uri="{BB962C8B-B14F-4D97-AF65-F5344CB8AC3E}">
-        <p14:creationId xmlns:p14="http://schemas.microsoft.com/office/powerpoint/2010/main" val="2261718782"/>
-      </p:ext>
-    </p:extLst>
   </p:cSld>
   <p:clrMapOvr>
     <a:masterClrMapping/>
@@ -1942,13 +1738,7 @@
       </p:grpSpPr>
       <p:sp>
         <p:nvSpPr>
-          <p:cNvPr id="2" name="标题 1">
-            <a:extLst>
-              <a:ext uri="{FF2B5EF4-FFF2-40B4-BE49-F238E27FC236}">
-                <a16:creationId xmlns:a16="http://schemas.microsoft.com/office/drawing/2014/main" id="{FAE47B77-E209-3C32-D21B-C60552585BB0}"/>
-              </a:ext>
-            </a:extLst>
-          </p:cNvPr>
+          <p:cNvPr id="2" name="标题 1"/>
           <p:cNvSpPr>
             <a:spLocks noGrp="1"/>
           </p:cNvSpPr>
@@ -1970,18 +1760,13 @@
               <a:rPr lang="zh-CN" altLang="en-US"/>
               <a:t>单击此处编辑母版标题样式</a:t>
             </a:r>
-          </a:p>
-        </p:txBody>
-      </p:sp>
-      <p:sp>
-        <p:nvSpPr>
-          <p:cNvPr id="3" name="文本占位符 2">
-            <a:extLst>
-              <a:ext uri="{FF2B5EF4-FFF2-40B4-BE49-F238E27FC236}">
-                <a16:creationId xmlns:a16="http://schemas.microsoft.com/office/drawing/2014/main" id="{17C84946-49F4-8061-829D-B2CB39F2B14A}"/>
-              </a:ext>
-            </a:extLst>
-          </p:cNvPr>
+            <a:endParaRPr lang="zh-CN" altLang="en-US"/>
+          </a:p>
+        </p:txBody>
+      </p:sp>
+      <p:sp>
+        <p:nvSpPr>
+          <p:cNvPr id="3" name="文本占位符 2"/>
           <p:cNvSpPr>
             <a:spLocks noGrp="1"/>
           </p:cNvSpPr>
@@ -2041,18 +1826,13 @@
               <a:rPr lang="zh-CN" altLang="en-US"/>
               <a:t>单击此处编辑母版文本样式</a:t>
             </a:r>
-          </a:p>
-        </p:txBody>
-      </p:sp>
-      <p:sp>
-        <p:nvSpPr>
-          <p:cNvPr id="4" name="内容占位符 3">
-            <a:extLst>
-              <a:ext uri="{FF2B5EF4-FFF2-40B4-BE49-F238E27FC236}">
-                <a16:creationId xmlns:a16="http://schemas.microsoft.com/office/drawing/2014/main" id="{80371B10-1717-79C0-DAAE-EA6E0009CD86}"/>
-              </a:ext>
-            </a:extLst>
-          </p:cNvPr>
+            <a:endParaRPr lang="zh-CN" altLang="en-US"/>
+          </a:p>
+        </p:txBody>
+      </p:sp>
+      <p:sp>
+        <p:nvSpPr>
+          <p:cNvPr id="4" name="内容占位符 3"/>
           <p:cNvSpPr>
             <a:spLocks noGrp="1"/>
           </p:cNvSpPr>
@@ -2075,6 +1855,7 @@
               <a:rPr lang="zh-CN" altLang="en-US"/>
               <a:t>单击此处编辑母版文本样式</a:t>
             </a:r>
+            <a:endParaRPr lang="zh-CN" altLang="en-US"/>
           </a:p>
           <a:p>
             <a:pPr lvl="1"/>
@@ -2082,6 +1863,7 @@
               <a:rPr lang="zh-CN" altLang="en-US"/>
               <a:t>二级</a:t>
             </a:r>
+            <a:endParaRPr lang="zh-CN" altLang="en-US"/>
           </a:p>
           <a:p>
             <a:pPr lvl="2"/>
@@ -2089,6 +1871,7 @@
               <a:rPr lang="zh-CN" altLang="en-US"/>
               <a:t>三级</a:t>
             </a:r>
+            <a:endParaRPr lang="zh-CN" altLang="en-US"/>
           </a:p>
           <a:p>
             <a:pPr lvl="3"/>
@@ -2096,6 +1879,7 @@
               <a:rPr lang="zh-CN" altLang="en-US"/>
               <a:t>四级</a:t>
             </a:r>
+            <a:endParaRPr lang="zh-CN" altLang="en-US"/>
           </a:p>
           <a:p>
             <a:pPr lvl="4"/>
@@ -2103,18 +1887,13 @@
               <a:rPr lang="zh-CN" altLang="en-US"/>
               <a:t>五级</a:t>
             </a:r>
-          </a:p>
-        </p:txBody>
-      </p:sp>
-      <p:sp>
-        <p:nvSpPr>
-          <p:cNvPr id="5" name="文本占位符 4">
-            <a:extLst>
-              <a:ext uri="{FF2B5EF4-FFF2-40B4-BE49-F238E27FC236}">
-                <a16:creationId xmlns:a16="http://schemas.microsoft.com/office/drawing/2014/main" id="{27C060C7-41FE-3FF8-0269-4D20EEF9D1A0}"/>
-              </a:ext>
-            </a:extLst>
-          </p:cNvPr>
+            <a:endParaRPr lang="zh-CN" altLang="en-US"/>
+          </a:p>
+        </p:txBody>
+      </p:sp>
+      <p:sp>
+        <p:nvSpPr>
+          <p:cNvPr id="5" name="文本占位符 4"/>
           <p:cNvSpPr>
             <a:spLocks noGrp="1"/>
           </p:cNvSpPr>
@@ -2174,18 +1953,13 @@
               <a:rPr lang="zh-CN" altLang="en-US"/>
               <a:t>单击此处编辑母版文本样式</a:t>
             </a:r>
-          </a:p>
-        </p:txBody>
-      </p:sp>
-      <p:sp>
-        <p:nvSpPr>
-          <p:cNvPr id="6" name="内容占位符 5">
-            <a:extLst>
-              <a:ext uri="{FF2B5EF4-FFF2-40B4-BE49-F238E27FC236}">
-                <a16:creationId xmlns:a16="http://schemas.microsoft.com/office/drawing/2014/main" id="{5D193036-B9CE-B9C0-BB1B-FE154C0756F3}"/>
-              </a:ext>
-            </a:extLst>
-          </p:cNvPr>
+            <a:endParaRPr lang="zh-CN" altLang="en-US"/>
+          </a:p>
+        </p:txBody>
+      </p:sp>
+      <p:sp>
+        <p:nvSpPr>
+          <p:cNvPr id="6" name="内容占位符 5"/>
           <p:cNvSpPr>
             <a:spLocks noGrp="1"/>
           </p:cNvSpPr>
@@ -2208,6 +1982,7 @@
               <a:rPr lang="zh-CN" altLang="en-US"/>
               <a:t>单击此处编辑母版文本样式</a:t>
             </a:r>
+            <a:endParaRPr lang="zh-CN" altLang="en-US"/>
           </a:p>
           <a:p>
             <a:pPr lvl="1"/>
@@ -2215,6 +1990,7 @@
               <a:rPr lang="zh-CN" altLang="en-US"/>
               <a:t>二级</a:t>
             </a:r>
+            <a:endParaRPr lang="zh-CN" altLang="en-US"/>
           </a:p>
           <a:p>
             <a:pPr lvl="2"/>
@@ -2222,6 +1998,7 @@
               <a:rPr lang="zh-CN" altLang="en-US"/>
               <a:t>三级</a:t>
             </a:r>
+            <a:endParaRPr lang="zh-CN" altLang="en-US"/>
           </a:p>
           <a:p>
             <a:pPr lvl="3"/>
@@ -2229,6 +2006,7 @@
               <a:rPr lang="zh-CN" altLang="en-US"/>
               <a:t>四级</a:t>
             </a:r>
+            <a:endParaRPr lang="zh-CN" altLang="en-US"/>
           </a:p>
           <a:p>
             <a:pPr lvl="4"/>
@@ -2236,18 +2014,13 @@
               <a:rPr lang="zh-CN" altLang="en-US"/>
               <a:t>五级</a:t>
             </a:r>
-          </a:p>
-        </p:txBody>
-      </p:sp>
-      <p:sp>
-        <p:nvSpPr>
-          <p:cNvPr id="7" name="日期占位符 6">
-            <a:extLst>
-              <a:ext uri="{FF2B5EF4-FFF2-40B4-BE49-F238E27FC236}">
-                <a16:creationId xmlns:a16="http://schemas.microsoft.com/office/drawing/2014/main" id="{75415A5A-8976-5E59-EC49-919146B48682}"/>
-              </a:ext>
-            </a:extLst>
-          </p:cNvPr>
+            <a:endParaRPr lang="zh-CN" altLang="en-US"/>
+          </a:p>
+        </p:txBody>
+      </p:sp>
+      <p:sp>
+        <p:nvSpPr>
+          <p:cNvPr id="7" name="日期占位符 6"/>
           <p:cNvSpPr>
             <a:spLocks noGrp="1"/>
           </p:cNvSpPr>
@@ -2262,7 +2035,6 @@
           <a:p>
             <a:fld id="{543585D4-02EC-47AF-960D-820FB9B3BEF7}" type="datetimeFigureOut">
               <a:rPr lang="zh-CN" altLang="en-US" smtClean="0"/>
-              <a:t>2022/5/23</a:t>
             </a:fld>
             <a:endParaRPr lang="zh-CN" altLang="en-US"/>
           </a:p>
@@ -2270,13 +2042,7 @@
       </p:sp>
       <p:sp>
         <p:nvSpPr>
-          <p:cNvPr id="8" name="页脚占位符 7">
-            <a:extLst>
-              <a:ext uri="{FF2B5EF4-FFF2-40B4-BE49-F238E27FC236}">
-                <a16:creationId xmlns:a16="http://schemas.microsoft.com/office/drawing/2014/main" id="{BC9738D4-B72B-039F-D9D3-8F46A58FC96D}"/>
-              </a:ext>
-            </a:extLst>
-          </p:cNvPr>
+          <p:cNvPr id="8" name="页脚占位符 7"/>
           <p:cNvSpPr>
             <a:spLocks noGrp="1"/>
           </p:cNvSpPr>
@@ -2295,13 +2061,7 @@
       </p:sp>
       <p:sp>
         <p:nvSpPr>
-          <p:cNvPr id="9" name="灯片编号占位符 8">
-            <a:extLst>
-              <a:ext uri="{FF2B5EF4-FFF2-40B4-BE49-F238E27FC236}">
-                <a16:creationId xmlns:a16="http://schemas.microsoft.com/office/drawing/2014/main" id="{6876648C-02EF-1695-38CC-C3A30AFD2CC3}"/>
-              </a:ext>
-            </a:extLst>
-          </p:cNvPr>
+          <p:cNvPr id="9" name="灯片编号占位符 8"/>
           <p:cNvSpPr>
             <a:spLocks noGrp="1"/>
           </p:cNvSpPr>
@@ -2316,18 +2076,12 @@
           <a:p>
             <a:fld id="{EA8DA225-941F-41DD-A69A-AB4863F4F7BA}" type="slidenum">
               <a:rPr lang="zh-CN" altLang="en-US" smtClean="0"/>
-              <a:t>‹#›</a:t>
             </a:fld>
             <a:endParaRPr lang="zh-CN" altLang="en-US"/>
           </a:p>
         </p:txBody>
       </p:sp>
     </p:spTree>
-    <p:extLst>
-      <p:ext uri="{BB962C8B-B14F-4D97-AF65-F5344CB8AC3E}">
-        <p14:creationId xmlns:p14="http://schemas.microsoft.com/office/powerpoint/2010/main" val="1365212344"/>
-      </p:ext>
-    </p:extLst>
   </p:cSld>
   <p:clrMapOvr>
     <a:masterClrMapping/>
@@ -2354,13 +2108,7 @@
       </p:grpSpPr>
       <p:sp>
         <p:nvSpPr>
-          <p:cNvPr id="2" name="标题 1">
-            <a:extLst>
-              <a:ext uri="{FF2B5EF4-FFF2-40B4-BE49-F238E27FC236}">
-                <a16:creationId xmlns:a16="http://schemas.microsoft.com/office/drawing/2014/main" id="{77017125-F88A-2378-1977-25ED2D70633E}"/>
-              </a:ext>
-            </a:extLst>
-          </p:cNvPr>
+          <p:cNvPr id="2" name="标题 1"/>
           <p:cNvSpPr>
             <a:spLocks noGrp="1"/>
           </p:cNvSpPr>
@@ -2377,18 +2125,13 @@
               <a:rPr lang="zh-CN" altLang="en-US"/>
               <a:t>单击此处编辑母版标题样式</a:t>
             </a:r>
-          </a:p>
-        </p:txBody>
-      </p:sp>
-      <p:sp>
-        <p:nvSpPr>
-          <p:cNvPr id="3" name="日期占位符 2">
-            <a:extLst>
-              <a:ext uri="{FF2B5EF4-FFF2-40B4-BE49-F238E27FC236}">
-                <a16:creationId xmlns:a16="http://schemas.microsoft.com/office/drawing/2014/main" id="{EAD41A48-FDBD-E966-0682-FFF5D1271762}"/>
-              </a:ext>
-            </a:extLst>
-          </p:cNvPr>
+            <a:endParaRPr lang="zh-CN" altLang="en-US"/>
+          </a:p>
+        </p:txBody>
+      </p:sp>
+      <p:sp>
+        <p:nvSpPr>
+          <p:cNvPr id="3" name="日期占位符 2"/>
           <p:cNvSpPr>
             <a:spLocks noGrp="1"/>
           </p:cNvSpPr>
@@ -2403,7 +2146,6 @@
           <a:p>
             <a:fld id="{543585D4-02EC-47AF-960D-820FB9B3BEF7}" type="datetimeFigureOut">
               <a:rPr lang="zh-CN" altLang="en-US" smtClean="0"/>
-              <a:t>2022/5/23</a:t>
             </a:fld>
             <a:endParaRPr lang="zh-CN" altLang="en-US"/>
           </a:p>
@@ -2411,13 +2153,7 @@
       </p:sp>
       <p:sp>
         <p:nvSpPr>
-          <p:cNvPr id="4" name="页脚占位符 3">
-            <a:extLst>
-              <a:ext uri="{FF2B5EF4-FFF2-40B4-BE49-F238E27FC236}">
-                <a16:creationId xmlns:a16="http://schemas.microsoft.com/office/drawing/2014/main" id="{71738F36-DD7B-C296-FB9E-58939A22C199}"/>
-              </a:ext>
-            </a:extLst>
-          </p:cNvPr>
+          <p:cNvPr id="4" name="页脚占位符 3"/>
           <p:cNvSpPr>
             <a:spLocks noGrp="1"/>
           </p:cNvSpPr>
@@ -2436,13 +2172,7 @@
       </p:sp>
       <p:sp>
         <p:nvSpPr>
-          <p:cNvPr id="5" name="灯片编号占位符 4">
-            <a:extLst>
-              <a:ext uri="{FF2B5EF4-FFF2-40B4-BE49-F238E27FC236}">
-                <a16:creationId xmlns:a16="http://schemas.microsoft.com/office/drawing/2014/main" id="{7C01C521-23B2-40B7-1D4E-B0A47E83F3FC}"/>
-              </a:ext>
-            </a:extLst>
-          </p:cNvPr>
+          <p:cNvPr id="5" name="灯片编号占位符 4"/>
           <p:cNvSpPr>
             <a:spLocks noGrp="1"/>
           </p:cNvSpPr>
@@ -2457,18 +2187,12 @@
           <a:p>
             <a:fld id="{EA8DA225-941F-41DD-A69A-AB4863F4F7BA}" type="slidenum">
               <a:rPr lang="zh-CN" altLang="en-US" smtClean="0"/>
-              <a:t>‹#›</a:t>
             </a:fld>
             <a:endParaRPr lang="zh-CN" altLang="en-US"/>
           </a:p>
         </p:txBody>
       </p:sp>
     </p:spTree>
-    <p:extLst>
-      <p:ext uri="{BB962C8B-B14F-4D97-AF65-F5344CB8AC3E}">
-        <p14:creationId xmlns:p14="http://schemas.microsoft.com/office/powerpoint/2010/main" val="2454225727"/>
-      </p:ext>
-    </p:extLst>
   </p:cSld>
   <p:clrMapOvr>
     <a:masterClrMapping/>
@@ -2495,13 +2219,7 @@
       </p:grpSpPr>
       <p:sp>
         <p:nvSpPr>
-          <p:cNvPr id="2" name="日期占位符 1">
-            <a:extLst>
-              <a:ext uri="{FF2B5EF4-FFF2-40B4-BE49-F238E27FC236}">
-                <a16:creationId xmlns:a16="http://schemas.microsoft.com/office/drawing/2014/main" id="{6DE6F827-251D-6B66-AD3F-838A90FB2A30}"/>
-              </a:ext>
-            </a:extLst>
-          </p:cNvPr>
+          <p:cNvPr id="2" name="日期占位符 1"/>
           <p:cNvSpPr>
             <a:spLocks noGrp="1"/>
           </p:cNvSpPr>
@@ -2516,7 +2234,6 @@
           <a:p>
             <a:fld id="{543585D4-02EC-47AF-960D-820FB9B3BEF7}" type="datetimeFigureOut">
               <a:rPr lang="zh-CN" altLang="en-US" smtClean="0"/>
-              <a:t>2022/5/23</a:t>
             </a:fld>
             <a:endParaRPr lang="zh-CN" altLang="en-US"/>
           </a:p>
@@ -2524,13 +2241,7 @@
       </p:sp>
       <p:sp>
         <p:nvSpPr>
-          <p:cNvPr id="3" name="页脚占位符 2">
-            <a:extLst>
-              <a:ext uri="{FF2B5EF4-FFF2-40B4-BE49-F238E27FC236}">
-                <a16:creationId xmlns:a16="http://schemas.microsoft.com/office/drawing/2014/main" id="{3833A4FD-CD1E-582F-8DEF-DF135013D6FD}"/>
-              </a:ext>
-            </a:extLst>
-          </p:cNvPr>
+          <p:cNvPr id="3" name="页脚占位符 2"/>
           <p:cNvSpPr>
             <a:spLocks noGrp="1"/>
           </p:cNvSpPr>
@@ -2549,13 +2260,7 @@
       </p:sp>
       <p:sp>
         <p:nvSpPr>
-          <p:cNvPr id="4" name="灯片编号占位符 3">
-            <a:extLst>
-              <a:ext uri="{FF2B5EF4-FFF2-40B4-BE49-F238E27FC236}">
-                <a16:creationId xmlns:a16="http://schemas.microsoft.com/office/drawing/2014/main" id="{991D03F8-CD0E-6DF1-B040-FE8D9C39507C}"/>
-              </a:ext>
-            </a:extLst>
-          </p:cNvPr>
+          <p:cNvPr id="4" name="灯片编号占位符 3"/>
           <p:cNvSpPr>
             <a:spLocks noGrp="1"/>
           </p:cNvSpPr>
@@ -2570,18 +2275,12 @@
           <a:p>
             <a:fld id="{EA8DA225-941F-41DD-A69A-AB4863F4F7BA}" type="slidenum">
               <a:rPr lang="zh-CN" altLang="en-US" smtClean="0"/>
-              <a:t>‹#›</a:t>
             </a:fld>
             <a:endParaRPr lang="zh-CN" altLang="en-US"/>
           </a:p>
         </p:txBody>
       </p:sp>
     </p:spTree>
-    <p:extLst>
-      <p:ext uri="{BB962C8B-B14F-4D97-AF65-F5344CB8AC3E}">
-        <p14:creationId xmlns:p14="http://schemas.microsoft.com/office/powerpoint/2010/main" val="1635393339"/>
-      </p:ext>
-    </p:extLst>
   </p:cSld>
   <p:clrMapOvr>
     <a:masterClrMapping/>
@@ -2608,13 +2307,7 @@
       </p:grpSpPr>
       <p:sp>
         <p:nvSpPr>
-          <p:cNvPr id="2" name="标题 1">
-            <a:extLst>
-              <a:ext uri="{FF2B5EF4-FFF2-40B4-BE49-F238E27FC236}">
-                <a16:creationId xmlns:a16="http://schemas.microsoft.com/office/drawing/2014/main" id="{3E417C56-BFB4-2FC8-A77A-9296219383EF}"/>
-              </a:ext>
-            </a:extLst>
-          </p:cNvPr>
+          <p:cNvPr id="2" name="标题 1"/>
           <p:cNvSpPr>
             <a:spLocks noGrp="1"/>
           </p:cNvSpPr>
@@ -2640,18 +2333,13 @@
               <a:rPr lang="zh-CN" altLang="en-US"/>
               <a:t>单击此处编辑母版标题样式</a:t>
             </a:r>
-          </a:p>
-        </p:txBody>
-      </p:sp>
-      <p:sp>
-        <p:nvSpPr>
-          <p:cNvPr id="3" name="内容占位符 2">
-            <a:extLst>
-              <a:ext uri="{FF2B5EF4-FFF2-40B4-BE49-F238E27FC236}">
-                <a16:creationId xmlns:a16="http://schemas.microsoft.com/office/drawing/2014/main" id="{34EBF55A-EE1A-9081-B229-7C97CD0F9668}"/>
-              </a:ext>
-            </a:extLst>
-          </p:cNvPr>
+            <a:endParaRPr lang="zh-CN" altLang="en-US"/>
+          </a:p>
+        </p:txBody>
+      </p:sp>
+      <p:sp>
+        <p:nvSpPr>
+          <p:cNvPr id="3" name="内容占位符 2"/>
           <p:cNvSpPr>
             <a:spLocks noGrp="1"/>
           </p:cNvSpPr>
@@ -2702,6 +2390,7 @@
               <a:rPr lang="zh-CN" altLang="en-US"/>
               <a:t>单击此处编辑母版文本样式</a:t>
             </a:r>
+            <a:endParaRPr lang="zh-CN" altLang="en-US"/>
           </a:p>
           <a:p>
             <a:pPr lvl="1"/>
@@ -2709,6 +2398,7 @@
               <a:rPr lang="zh-CN" altLang="en-US"/>
               <a:t>二级</a:t>
             </a:r>
+            <a:endParaRPr lang="zh-CN" altLang="en-US"/>
           </a:p>
           <a:p>
             <a:pPr lvl="2"/>
@@ -2716,6 +2406,7 @@
               <a:rPr lang="zh-CN" altLang="en-US"/>
               <a:t>三级</a:t>
             </a:r>
+            <a:endParaRPr lang="zh-CN" altLang="en-US"/>
           </a:p>
           <a:p>
             <a:pPr lvl="3"/>
@@ -2723,6 +2414,7 @@
               <a:rPr lang="zh-CN" altLang="en-US"/>
               <a:t>四级</a:t>
             </a:r>
+            <a:endParaRPr lang="zh-CN" altLang="en-US"/>
           </a:p>
           <a:p>
             <a:pPr lvl="4"/>
@@ -2730,18 +2422,13 @@
               <a:rPr lang="zh-CN" altLang="en-US"/>
               <a:t>五级</a:t>
             </a:r>
-          </a:p>
-        </p:txBody>
-      </p:sp>
-      <p:sp>
-        <p:nvSpPr>
-          <p:cNvPr id="4" name="文本占位符 3">
-            <a:extLst>
-              <a:ext uri="{FF2B5EF4-FFF2-40B4-BE49-F238E27FC236}">
-                <a16:creationId xmlns:a16="http://schemas.microsoft.com/office/drawing/2014/main" id="{1D9FEE4C-F581-B79F-AA65-2751F84E63B2}"/>
-              </a:ext>
-            </a:extLst>
-          </p:cNvPr>
+            <a:endParaRPr lang="zh-CN" altLang="en-US"/>
+          </a:p>
+        </p:txBody>
+      </p:sp>
+      <p:sp>
+        <p:nvSpPr>
+          <p:cNvPr id="4" name="文本占位符 3"/>
           <p:cNvSpPr>
             <a:spLocks noGrp="1"/>
           </p:cNvSpPr>
@@ -2801,18 +2488,13 @@
               <a:rPr lang="zh-CN" altLang="en-US"/>
               <a:t>单击此处编辑母版文本样式</a:t>
             </a:r>
-          </a:p>
-        </p:txBody>
-      </p:sp>
-      <p:sp>
-        <p:nvSpPr>
-          <p:cNvPr id="5" name="日期占位符 4">
-            <a:extLst>
-              <a:ext uri="{FF2B5EF4-FFF2-40B4-BE49-F238E27FC236}">
-                <a16:creationId xmlns:a16="http://schemas.microsoft.com/office/drawing/2014/main" id="{2E42B6E2-A886-811D-3DC5-A3A498E9E460}"/>
-              </a:ext>
-            </a:extLst>
-          </p:cNvPr>
+            <a:endParaRPr lang="zh-CN" altLang="en-US"/>
+          </a:p>
+        </p:txBody>
+      </p:sp>
+      <p:sp>
+        <p:nvSpPr>
+          <p:cNvPr id="5" name="日期占位符 4"/>
           <p:cNvSpPr>
             <a:spLocks noGrp="1"/>
           </p:cNvSpPr>
@@ -2827,7 +2509,6 @@
           <a:p>
             <a:fld id="{543585D4-02EC-47AF-960D-820FB9B3BEF7}" type="datetimeFigureOut">
               <a:rPr lang="zh-CN" altLang="en-US" smtClean="0"/>
-              <a:t>2022/5/23</a:t>
             </a:fld>
             <a:endParaRPr lang="zh-CN" altLang="en-US"/>
           </a:p>
@@ -2835,13 +2516,7 @@
       </p:sp>
       <p:sp>
         <p:nvSpPr>
-          <p:cNvPr id="6" name="页脚占位符 5">
-            <a:extLst>
-              <a:ext uri="{FF2B5EF4-FFF2-40B4-BE49-F238E27FC236}">
-                <a16:creationId xmlns:a16="http://schemas.microsoft.com/office/drawing/2014/main" id="{0733F78D-BE84-B598-F756-FAF36F4011BD}"/>
-              </a:ext>
-            </a:extLst>
-          </p:cNvPr>
+          <p:cNvPr id="6" name="页脚占位符 5"/>
           <p:cNvSpPr>
             <a:spLocks noGrp="1"/>
           </p:cNvSpPr>
@@ -2860,13 +2535,7 @@
       </p:sp>
       <p:sp>
         <p:nvSpPr>
-          <p:cNvPr id="7" name="灯片编号占位符 6">
-            <a:extLst>
-              <a:ext uri="{FF2B5EF4-FFF2-40B4-BE49-F238E27FC236}">
-                <a16:creationId xmlns:a16="http://schemas.microsoft.com/office/drawing/2014/main" id="{F3B65907-7397-815B-B686-24EB24F49E8B}"/>
-              </a:ext>
-            </a:extLst>
-          </p:cNvPr>
+          <p:cNvPr id="7" name="灯片编号占位符 6"/>
           <p:cNvSpPr>
             <a:spLocks noGrp="1"/>
           </p:cNvSpPr>
@@ -2881,18 +2550,12 @@
           <a:p>
             <a:fld id="{EA8DA225-941F-41DD-A69A-AB4863F4F7BA}" type="slidenum">
               <a:rPr lang="zh-CN" altLang="en-US" smtClean="0"/>
-              <a:t>‹#›</a:t>
             </a:fld>
             <a:endParaRPr lang="zh-CN" altLang="en-US"/>
           </a:p>
         </p:txBody>
       </p:sp>
     </p:spTree>
-    <p:extLst>
-      <p:ext uri="{BB962C8B-B14F-4D97-AF65-F5344CB8AC3E}">
-        <p14:creationId xmlns:p14="http://schemas.microsoft.com/office/powerpoint/2010/main" val="1247886049"/>
-      </p:ext>
-    </p:extLst>
   </p:cSld>
   <p:clrMapOvr>
     <a:masterClrMapping/>
@@ -2919,13 +2582,7 @@
       </p:grpSpPr>
       <p:sp>
         <p:nvSpPr>
-          <p:cNvPr id="2" name="标题 1">
-            <a:extLst>
-              <a:ext uri="{FF2B5EF4-FFF2-40B4-BE49-F238E27FC236}">
-                <a16:creationId xmlns:a16="http://schemas.microsoft.com/office/drawing/2014/main" id="{4C347C21-AE7D-6A9C-2CF3-C7185B47E6E4}"/>
-              </a:ext>
-            </a:extLst>
-          </p:cNvPr>
+          <p:cNvPr id="2" name="标题 1"/>
           <p:cNvSpPr>
             <a:spLocks noGrp="1"/>
           </p:cNvSpPr>
@@ -2951,18 +2608,13 @@
               <a:rPr lang="zh-CN" altLang="en-US"/>
               <a:t>单击此处编辑母版标题样式</a:t>
             </a:r>
-          </a:p>
-        </p:txBody>
-      </p:sp>
-      <p:sp>
-        <p:nvSpPr>
-          <p:cNvPr id="3" name="图片占位符 2">
-            <a:extLst>
-              <a:ext uri="{FF2B5EF4-FFF2-40B4-BE49-F238E27FC236}">
-                <a16:creationId xmlns:a16="http://schemas.microsoft.com/office/drawing/2014/main" id="{ADD0265F-BCCA-4393-1D97-9A1C469C8C89}"/>
-              </a:ext>
-            </a:extLst>
-          </p:cNvPr>
+            <a:endParaRPr lang="zh-CN" altLang="en-US"/>
+          </a:p>
+        </p:txBody>
+      </p:sp>
+      <p:sp>
+        <p:nvSpPr>
+          <p:cNvPr id="3" name="图片占位符 2"/>
           <p:cNvSpPr>
             <a:spLocks noGrp="1"/>
           </p:cNvSpPr>
@@ -3023,13 +2675,7 @@
       </p:sp>
       <p:sp>
         <p:nvSpPr>
-          <p:cNvPr id="4" name="文本占位符 3">
-            <a:extLst>
-              <a:ext uri="{FF2B5EF4-FFF2-40B4-BE49-F238E27FC236}">
-                <a16:creationId xmlns:a16="http://schemas.microsoft.com/office/drawing/2014/main" id="{16BFCD1C-24A2-3EF2-1828-79E7D702A994}"/>
-              </a:ext>
-            </a:extLst>
-          </p:cNvPr>
+          <p:cNvPr id="4" name="文本占位符 3"/>
           <p:cNvSpPr>
             <a:spLocks noGrp="1"/>
           </p:cNvSpPr>
@@ -3089,18 +2735,13 @@
               <a:rPr lang="zh-CN" altLang="en-US"/>
               <a:t>单击此处编辑母版文本样式</a:t>
             </a:r>
-          </a:p>
-        </p:txBody>
-      </p:sp>
-      <p:sp>
-        <p:nvSpPr>
-          <p:cNvPr id="5" name="日期占位符 4">
-            <a:extLst>
-              <a:ext uri="{FF2B5EF4-FFF2-40B4-BE49-F238E27FC236}">
-                <a16:creationId xmlns:a16="http://schemas.microsoft.com/office/drawing/2014/main" id="{AE7E796A-1F5D-81A1-BB03-BDC21716A97E}"/>
-              </a:ext>
-            </a:extLst>
-          </p:cNvPr>
+            <a:endParaRPr lang="zh-CN" altLang="en-US"/>
+          </a:p>
+        </p:txBody>
+      </p:sp>
+      <p:sp>
+        <p:nvSpPr>
+          <p:cNvPr id="5" name="日期占位符 4"/>
           <p:cNvSpPr>
             <a:spLocks noGrp="1"/>
           </p:cNvSpPr>
@@ -3115,7 +2756,6 @@
           <a:p>
             <a:fld id="{543585D4-02EC-47AF-960D-820FB9B3BEF7}" type="datetimeFigureOut">
               <a:rPr lang="zh-CN" altLang="en-US" smtClean="0"/>
-              <a:t>2022/5/23</a:t>
             </a:fld>
             <a:endParaRPr lang="zh-CN" altLang="en-US"/>
           </a:p>
@@ -3123,13 +2763,7 @@
       </p:sp>
       <p:sp>
         <p:nvSpPr>
-          <p:cNvPr id="6" name="页脚占位符 5">
-            <a:extLst>
-              <a:ext uri="{FF2B5EF4-FFF2-40B4-BE49-F238E27FC236}">
-                <a16:creationId xmlns:a16="http://schemas.microsoft.com/office/drawing/2014/main" id="{9ADACE29-BEDC-97FA-5FC2-8C97CEB3C2CE}"/>
-              </a:ext>
-            </a:extLst>
-          </p:cNvPr>
+          <p:cNvPr id="6" name="页脚占位符 5"/>
           <p:cNvSpPr>
             <a:spLocks noGrp="1"/>
           </p:cNvSpPr>
@@ -3148,13 +2782,7 @@
       </p:sp>
       <p:sp>
         <p:nvSpPr>
-          <p:cNvPr id="7" name="灯片编号占位符 6">
-            <a:extLst>
-              <a:ext uri="{FF2B5EF4-FFF2-40B4-BE49-F238E27FC236}">
-                <a16:creationId xmlns:a16="http://schemas.microsoft.com/office/drawing/2014/main" id="{BEB6AFEA-C15C-9BC1-1E8D-C7A8C3C2AC1F}"/>
-              </a:ext>
-            </a:extLst>
-          </p:cNvPr>
+          <p:cNvPr id="7" name="灯片编号占位符 6"/>
           <p:cNvSpPr>
             <a:spLocks noGrp="1"/>
           </p:cNvSpPr>
@@ -3169,18 +2797,12 @@
           <a:p>
             <a:fld id="{EA8DA225-941F-41DD-A69A-AB4863F4F7BA}" type="slidenum">
               <a:rPr lang="zh-CN" altLang="en-US" smtClean="0"/>
-              <a:t>‹#›</a:t>
             </a:fld>
             <a:endParaRPr lang="zh-CN" altLang="en-US"/>
           </a:p>
         </p:txBody>
       </p:sp>
     </p:spTree>
-    <p:extLst>
-      <p:ext uri="{BB962C8B-B14F-4D97-AF65-F5344CB8AC3E}">
-        <p14:creationId xmlns:p14="http://schemas.microsoft.com/office/powerpoint/2010/main" val="1639711230"/>
-      </p:ext>
-    </p:extLst>
   </p:cSld>
   <p:clrMapOvr>
     <a:masterClrMapping/>
@@ -3212,13 +2834,7 @@
       </p:grpSpPr>
       <p:sp>
         <p:nvSpPr>
-          <p:cNvPr id="2" name="标题占位符 1">
-            <a:extLst>
-              <a:ext uri="{FF2B5EF4-FFF2-40B4-BE49-F238E27FC236}">
-                <a16:creationId xmlns:a16="http://schemas.microsoft.com/office/drawing/2014/main" id="{A112B06B-CE51-0CC9-1742-FEF85CB53313}"/>
-              </a:ext>
-            </a:extLst>
-          </p:cNvPr>
+          <p:cNvPr id="2" name="标题占位符 1"/>
           <p:cNvSpPr>
             <a:spLocks noGrp="1"/>
           </p:cNvSpPr>
@@ -3245,18 +2861,13 @@
               <a:rPr lang="zh-CN" altLang="en-US"/>
               <a:t>单击此处编辑母版标题样式</a:t>
             </a:r>
-          </a:p>
-        </p:txBody>
-      </p:sp>
-      <p:sp>
-        <p:nvSpPr>
-          <p:cNvPr id="3" name="文本占位符 2">
-            <a:extLst>
-              <a:ext uri="{FF2B5EF4-FFF2-40B4-BE49-F238E27FC236}">
-                <a16:creationId xmlns:a16="http://schemas.microsoft.com/office/drawing/2014/main" id="{5987D60D-54B4-BA12-A096-4C39A7780D75}"/>
-              </a:ext>
-            </a:extLst>
-          </p:cNvPr>
+            <a:endParaRPr lang="zh-CN" altLang="en-US"/>
+          </a:p>
+        </p:txBody>
+      </p:sp>
+      <p:sp>
+        <p:nvSpPr>
+          <p:cNvPr id="3" name="文本占位符 2"/>
           <p:cNvSpPr>
             <a:spLocks noGrp="1"/>
           </p:cNvSpPr>
@@ -3284,6 +2895,7 @@
               <a:rPr lang="zh-CN" altLang="en-US"/>
               <a:t>单击此处编辑母版文本样式</a:t>
             </a:r>
+            <a:endParaRPr lang="zh-CN" altLang="en-US"/>
           </a:p>
           <a:p>
             <a:pPr lvl="1"/>
@@ -3291,6 +2903,7 @@
               <a:rPr lang="zh-CN" altLang="en-US"/>
               <a:t>二级</a:t>
             </a:r>
+            <a:endParaRPr lang="zh-CN" altLang="en-US"/>
           </a:p>
           <a:p>
             <a:pPr lvl="2"/>
@@ -3298,6 +2911,7 @@
               <a:rPr lang="zh-CN" altLang="en-US"/>
               <a:t>三级</a:t>
             </a:r>
+            <a:endParaRPr lang="zh-CN" altLang="en-US"/>
           </a:p>
           <a:p>
             <a:pPr lvl="3"/>
@@ -3305,6 +2919,7 @@
               <a:rPr lang="zh-CN" altLang="en-US"/>
               <a:t>四级</a:t>
             </a:r>
+            <a:endParaRPr lang="zh-CN" altLang="en-US"/>
           </a:p>
           <a:p>
             <a:pPr lvl="4"/>
@@ -3312,18 +2927,13 @@
               <a:rPr lang="zh-CN" altLang="en-US"/>
               <a:t>五级</a:t>
             </a:r>
-          </a:p>
-        </p:txBody>
-      </p:sp>
-      <p:sp>
-        <p:nvSpPr>
-          <p:cNvPr id="4" name="日期占位符 3">
-            <a:extLst>
-              <a:ext uri="{FF2B5EF4-FFF2-40B4-BE49-F238E27FC236}">
-                <a16:creationId xmlns:a16="http://schemas.microsoft.com/office/drawing/2014/main" id="{C0B482B3-0AEF-3A2D-5975-B909D6AB9D96}"/>
-              </a:ext>
-            </a:extLst>
-          </p:cNvPr>
+            <a:endParaRPr lang="zh-CN" altLang="en-US"/>
+          </a:p>
+        </p:txBody>
+      </p:sp>
+      <p:sp>
+        <p:nvSpPr>
+          <p:cNvPr id="4" name="日期占位符 3"/>
           <p:cNvSpPr>
             <a:spLocks noGrp="1"/>
           </p:cNvSpPr>
@@ -3356,7 +2966,6 @@
           <a:p>
             <a:fld id="{543585D4-02EC-47AF-960D-820FB9B3BEF7}" type="datetimeFigureOut">
               <a:rPr lang="zh-CN" altLang="en-US" smtClean="0"/>
-              <a:t>2022/5/23</a:t>
             </a:fld>
             <a:endParaRPr lang="zh-CN" altLang="en-US"/>
           </a:p>
@@ -3364,13 +2973,7 @@
       </p:sp>
       <p:sp>
         <p:nvSpPr>
-          <p:cNvPr id="5" name="页脚占位符 4">
-            <a:extLst>
-              <a:ext uri="{FF2B5EF4-FFF2-40B4-BE49-F238E27FC236}">
-                <a16:creationId xmlns:a16="http://schemas.microsoft.com/office/drawing/2014/main" id="{5EC1F374-026A-D536-935A-ECCB1142D198}"/>
-              </a:ext>
-            </a:extLst>
-          </p:cNvPr>
+          <p:cNvPr id="5" name="页脚占位符 4"/>
           <p:cNvSpPr>
             <a:spLocks noGrp="1"/>
           </p:cNvSpPr>
@@ -3407,13 +3010,7 @@
       </p:sp>
       <p:sp>
         <p:nvSpPr>
-          <p:cNvPr id="6" name="灯片编号占位符 5">
-            <a:extLst>
-              <a:ext uri="{FF2B5EF4-FFF2-40B4-BE49-F238E27FC236}">
-                <a16:creationId xmlns:a16="http://schemas.microsoft.com/office/drawing/2014/main" id="{6B6E7304-D68E-807B-06BD-9F4E7A28A294}"/>
-              </a:ext>
-            </a:extLst>
-          </p:cNvPr>
+          <p:cNvPr id="6" name="灯片编号占位符 5"/>
           <p:cNvSpPr>
             <a:spLocks noGrp="1"/>
           </p:cNvSpPr>
@@ -3446,18 +3043,12 @@
           <a:p>
             <a:fld id="{EA8DA225-941F-41DD-A69A-AB4863F4F7BA}" type="slidenum">
               <a:rPr lang="zh-CN" altLang="en-US" smtClean="0"/>
-              <a:t>‹#›</a:t>
             </a:fld>
             <a:endParaRPr lang="zh-CN" altLang="en-US"/>
           </a:p>
         </p:txBody>
       </p:sp>
     </p:spTree>
-    <p:extLst>
-      <p:ext uri="{BB962C8B-B14F-4D97-AF65-F5344CB8AC3E}">
-        <p14:creationId xmlns:p14="http://schemas.microsoft.com/office/powerpoint/2010/main" val="2975358282"/>
-      </p:ext>
-    </p:extLst>
   </p:cSld>
   <p:clrMap bg1="lt1" tx1="dk1" bg2="lt2" tx2="dk2" accent1="accent1" accent2="accent2" accent3="accent3" accent4="accent4" accent5="accent5" accent6="accent6" hlink="hlink" folHlink="folHlink"/>
   <p:sldLayoutIdLst>
@@ -3774,11 +3365,6 @@
         </a:xfrm>
       </p:grpSpPr>
     </p:spTree>
-    <p:extLst>
-      <p:ext uri="{BB962C8B-B14F-4D97-AF65-F5344CB8AC3E}">
-        <p14:creationId xmlns:p14="http://schemas.microsoft.com/office/powerpoint/2010/main" val="2389741141"/>
-      </p:ext>
-    </p:extLst>
   </p:cSld>
   <p:clrMapOvr>
     <a:masterClrMapping/>
@@ -3804,11 +3390,6 @@
         </a:xfrm>
       </p:grpSpPr>
     </p:spTree>
-    <p:extLst>
-      <p:ext uri="{BB962C8B-B14F-4D97-AF65-F5344CB8AC3E}">
-        <p14:creationId xmlns:p14="http://schemas.microsoft.com/office/powerpoint/2010/main" val="2670916515"/>
-      </p:ext>
-    </p:extLst>
   </p:cSld>
   <p:clrMapOvr>
     <a:masterClrMapping/>
@@ -3834,11 +3415,6 @@
         </a:xfrm>
       </p:grpSpPr>
     </p:spTree>
-    <p:extLst>
-      <p:ext uri="{BB962C8B-B14F-4D97-AF65-F5344CB8AC3E}">
-        <p14:creationId xmlns:p14="http://schemas.microsoft.com/office/powerpoint/2010/main" val="515070791"/>
-      </p:ext>
-    </p:extLst>
   </p:cSld>
   <p:clrMapOvr>
     <a:masterClrMapping/>
@@ -3864,11 +3440,31 @@
         </a:xfrm>
       </p:grpSpPr>
     </p:spTree>
-    <p:extLst>
-      <p:ext uri="{BB962C8B-B14F-4D97-AF65-F5344CB8AC3E}">
-        <p14:creationId xmlns:p14="http://schemas.microsoft.com/office/powerpoint/2010/main" val="1331211817"/>
-      </p:ext>
-    </p:extLst>
+  </p:cSld>
+  <p:clrMapOvr>
+    <a:masterClrMapping/>
+  </p:clrMapOvr>
+</p:sld>
+</file>
+
+<file path=ppt/slides/slide13.xml><?xml version="1.0" encoding="utf-8"?>
+<p:sld xmlns:a="http://schemas.openxmlformats.org/drawingml/2006/main" xmlns:r="http://schemas.openxmlformats.org/officeDocument/2006/relationships" xmlns:p="http://schemas.openxmlformats.org/presentationml/2006/main">
+  <p:cSld>
+    <p:spTree>
+      <p:nvGrpSpPr>
+        <p:cNvPr id="1" name=""/>
+        <p:cNvGrpSpPr/>
+        <p:nvPr/>
+      </p:nvGrpSpPr>
+      <p:grpSpPr>
+        <a:xfrm>
+          <a:off x="0" y="0"/>
+          <a:ext cx="0" cy="0"/>
+          <a:chOff x="0" y="0"/>
+          <a:chExt cx="0" cy="0"/>
+        </a:xfrm>
+      </p:grpSpPr>
+    </p:spTree>
   </p:cSld>
   <p:clrMapOvr>
     <a:masterClrMapping/>
@@ -3885,30 +3481,17 @@
         <p:cNvGrpSpPr/>
         <p:nvPr/>
       </p:nvGrpSpPr>
-      <p:grpSpPr>
-        <a:xfrm>
-          <a:off x="0" y="0"/>
-          <a:ext cx="0" cy="0"/>
-          <a:chOff x="0" y="0"/>
-          <a:chExt cx="0" cy="0"/>
-        </a:xfrm>
-      </p:grpSpPr>
-      <p:sp>
-        <p:nvSpPr>
-          <p:cNvPr id="4" name="文本框 3">
-            <a:extLst>
-              <a:ext uri="{FF2B5EF4-FFF2-40B4-BE49-F238E27FC236}">
-                <a16:creationId xmlns:a16="http://schemas.microsoft.com/office/drawing/2014/main" id="{4AB5BC2C-60CA-8D8E-17E3-7BDFAE41C3A3}"/>
-              </a:ext>
-            </a:extLst>
-          </p:cNvPr>
+      <p:grpSpPr/>
+      <p:sp>
+        <p:nvSpPr>
+          <p:cNvPr id="2" name="文本框 1"/>
           <p:cNvSpPr txBox="1"/>
           <p:nvPr/>
         </p:nvSpPr>
         <p:spPr>
           <a:xfrm>
-            <a:off x="682283" y="682283"/>
-            <a:ext cx="10827434" cy="3939540"/>
+            <a:off x="306705" y="207010"/>
+            <a:ext cx="2394585" cy="521970"/>
           </a:xfrm>
           <a:prstGeom prst="rect">
             <a:avLst/>
@@ -3919,157 +3502,343 @@
           <a:bodyPr wrap="square" rtlCol="0">
             <a:spAutoFit/>
           </a:bodyPr>
-          <a:lstStyle/>
-          <a:p>
-            <a:r>
-              <a:rPr lang="zh-CN" altLang="en-US" sz="2800" b="1" dirty="0"/>
-              <a:t>是什么？</a:t>
-            </a:r>
-            <a:endParaRPr lang="en-US" altLang="zh-CN" b="1" dirty="0"/>
-          </a:p>
-          <a:p>
-            <a:r>
-              <a:rPr lang="en-US" altLang="zh-CN" dirty="0"/>
-              <a:t>std::function </a:t>
-            </a:r>
-            <a:r>
-              <a:rPr lang="zh-CN" altLang="en-US" dirty="0"/>
-              <a:t>是一种通用，多态的函数封装，一种类型安全的包裹（相比，函数指针则是类型不安全的）。</a:t>
-            </a:r>
-            <a:endParaRPr lang="en-US" altLang="zh-CN" dirty="0"/>
-          </a:p>
-          <a:p>
-            <a:endParaRPr lang="en-US" altLang="zh-CN" dirty="0"/>
-          </a:p>
-          <a:p>
-            <a:r>
-              <a:rPr lang="zh-CN" altLang="en-US" sz="2800" b="1" dirty="0"/>
-              <a:t>做什么</a:t>
-            </a:r>
-            <a:endParaRPr lang="en-US" altLang="zh-CN" sz="2800" b="1" dirty="0"/>
-          </a:p>
-          <a:p>
-            <a:r>
-              <a:rPr lang="zh-CN" altLang="en-US" dirty="0"/>
-              <a:t>可以对任何</a:t>
-            </a:r>
-            <a:r>
-              <a:rPr lang="en-US" altLang="zh-CN" dirty="0"/>
-              <a:t>callable(</a:t>
-            </a:r>
-            <a:r>
-              <a:rPr lang="zh-CN" altLang="en-US" dirty="0"/>
-              <a:t>普通函数，</a:t>
-            </a:r>
-            <a:r>
-              <a:rPr lang="en-US" altLang="zh-CN" dirty="0"/>
-              <a:t>lambda</a:t>
-            </a:r>
-            <a:r>
-              <a:rPr lang="zh-CN" altLang="en-US" dirty="0"/>
-              <a:t>表达式，类对象</a:t>
-            </a:r>
-            <a:r>
-              <a:rPr lang="en-US" altLang="zh-CN" dirty="0"/>
-              <a:t>)</a:t>
-            </a:r>
-            <a:r>
-              <a:rPr lang="zh-CN" altLang="en-US" dirty="0"/>
-              <a:t>进行</a:t>
-            </a:r>
-            <a:r>
-              <a:rPr lang="zh-CN" altLang="en-US" b="1" dirty="0"/>
-              <a:t>存储，复制和调用</a:t>
-            </a:r>
-            <a:r>
-              <a:rPr lang="zh-CN" altLang="en-US" dirty="0"/>
-              <a:t>操作。</a:t>
-            </a:r>
-            <a:endParaRPr lang="en-US" altLang="zh-CN" sz="2800" b="1" dirty="0"/>
-          </a:p>
-          <a:p>
-            <a:r>
-              <a:rPr lang="zh-CN" altLang="en-US" dirty="0"/>
-              <a:t>最大的作用就是实现 </a:t>
-            </a:r>
-            <a:r>
-              <a:rPr lang="zh-CN" altLang="en-US" sz="2400" b="1" dirty="0"/>
-              <a:t>函数回调</a:t>
-            </a:r>
-            <a:r>
-              <a:rPr lang="zh-CN" altLang="en-US" sz="1600" b="1" dirty="0"/>
-              <a:t>（</a:t>
-            </a:r>
-            <a:r>
-              <a:rPr lang="zh-CN" altLang="en-US" sz="1600" dirty="0"/>
-              <a:t>即先存起来，使用时再用，做到延迟执行</a:t>
-            </a:r>
-            <a:r>
-              <a:rPr lang="zh-CN" altLang="en-US" sz="1600" b="1" dirty="0"/>
-              <a:t>）</a:t>
-            </a:r>
-            <a:endParaRPr lang="en-US" altLang="zh-CN" sz="2400" b="1" dirty="0"/>
-          </a:p>
-          <a:p>
-            <a:r>
-              <a:rPr lang="en-US" altLang="zh-CN" dirty="0"/>
-              <a:t>std::function </a:t>
-            </a:r>
-            <a:r>
-              <a:rPr lang="zh-CN" altLang="en-US" dirty="0"/>
-              <a:t>实现了一套类型消除机制，可以统一处理不同的函数对象类型</a:t>
-            </a:r>
-            <a:endParaRPr lang="en-US" altLang="zh-CN" sz="2000" dirty="0"/>
-          </a:p>
-          <a:p>
-            <a:endParaRPr lang="en-US" altLang="zh-CN" sz="2800" b="1" dirty="0"/>
-          </a:p>
-          <a:p>
-            <a:r>
-              <a:rPr lang="zh-CN" altLang="en-US" sz="2800" b="1" dirty="0"/>
-              <a:t>为什么？</a:t>
-            </a:r>
-            <a:endParaRPr lang="en-US" altLang="zh-CN" sz="2800" b="1" dirty="0"/>
-          </a:p>
-          <a:p>
-            <a:r>
-              <a:rPr lang="zh-CN" altLang="en-US" dirty="0"/>
-              <a:t>通过</a:t>
-            </a:r>
-            <a:r>
-              <a:rPr lang="en-US" altLang="zh-CN" dirty="0"/>
-              <a:t>std::function </a:t>
-            </a:r>
-            <a:r>
-              <a:rPr lang="zh-CN" altLang="en-US" dirty="0"/>
-              <a:t>对</a:t>
-            </a:r>
-            <a:r>
-              <a:rPr lang="en-US" altLang="zh-CN" dirty="0"/>
-              <a:t>C++</a:t>
-            </a:r>
-            <a:r>
-              <a:rPr lang="zh-CN" altLang="en-US" dirty="0"/>
-              <a:t>中各可调用实体的封装，形成一个新的可调用的</a:t>
-            </a:r>
-            <a:r>
-              <a:rPr lang="en-US" altLang="zh-CN" dirty="0"/>
-              <a:t>std::function</a:t>
-            </a:r>
-            <a:r>
-              <a:rPr lang="zh-CN" altLang="en-US" dirty="0"/>
-              <a:t>对象，让使用者不需要关心那么多的可调用实体。</a:t>
-            </a:r>
-            <a:endParaRPr lang="zh-CN" altLang="en-US" sz="2400" dirty="0"/>
+          <a:p>
+            <a:r>
+              <a:rPr lang="en-US" altLang="zh-CN" sz="2800">
+                <a:solidFill>
+                  <a:schemeClr val="tx1"/>
+                </a:solidFill>
+                <a:uFillTx/>
+                <a:latin typeface="Times New Roman" panose="02020603050405020304" charset="0"/>
+                <a:ea typeface="楷体" panose="02010609060101010101" charset="-122"/>
+              </a:rPr>
+              <a:t>C++ </a:t>
+            </a:r>
+            <a:r>
+              <a:rPr lang="zh-CN" altLang="en-US" sz="2800">
+                <a:solidFill>
+                  <a:schemeClr val="tx1"/>
+                </a:solidFill>
+                <a:uFillTx/>
+                <a:latin typeface="Times New Roman" panose="02020603050405020304" charset="0"/>
+                <a:ea typeface="楷体" panose="02010609060101010101" charset="-122"/>
+              </a:rPr>
+              <a:t>回调</a:t>
+            </a:r>
+            <a:endParaRPr lang="zh-CN" altLang="en-US" sz="2800">
+              <a:solidFill>
+                <a:schemeClr val="tx1"/>
+              </a:solidFill>
+              <a:uFillTx/>
+              <a:latin typeface="Times New Roman" panose="02020603050405020304" charset="0"/>
+              <a:ea typeface="楷体" panose="02010609060101010101" charset="-122"/>
+            </a:endParaRPr>
+          </a:p>
+        </p:txBody>
+      </p:sp>
+      <p:sp>
+        <p:nvSpPr>
+          <p:cNvPr id="3" name="文本框 2"/>
+          <p:cNvSpPr txBox="1"/>
+          <p:nvPr/>
+        </p:nvSpPr>
+        <p:spPr>
+          <a:xfrm>
+            <a:off x="465455" y="936625"/>
+            <a:ext cx="11175365" cy="2861310"/>
+          </a:xfrm>
+          <a:prstGeom prst="rect">
+            <a:avLst/>
+          </a:prstGeom>
+          <a:noFill/>
+        </p:spPr>
+        <p:txBody>
+          <a:bodyPr wrap="square" rtlCol="0">
+            <a:spAutoFit/>
+          </a:bodyPr>
+          <a:p>
+            <a:r>
+              <a:rPr lang="zh-CN" altLang="en-US">
+                <a:solidFill>
+                  <a:schemeClr val="tx1"/>
+                </a:solidFill>
+                <a:uFillTx/>
+                <a:latin typeface="Calibri" panose="020F0502020204030204" charset="0"/>
+                <a:ea typeface="楷体" panose="02010609060101010101" charset="-122"/>
+              </a:rPr>
+              <a:t>回调的本质以某种形式</a:t>
+            </a:r>
+            <a:r>
+              <a:rPr lang="zh-CN" altLang="en-US" b="1">
+                <a:solidFill>
+                  <a:schemeClr val="tx1"/>
+                </a:solidFill>
+                <a:uFillTx/>
+                <a:latin typeface="Calibri" panose="020F0502020204030204" charset="0"/>
+                <a:ea typeface="楷体" panose="02010609060101010101" charset="-122"/>
+              </a:rPr>
+              <a:t>持有调用者，</a:t>
+            </a:r>
+            <a:r>
+              <a:rPr lang="zh-CN" altLang="en-US">
+                <a:solidFill>
+                  <a:schemeClr val="tx1"/>
+                </a:solidFill>
+                <a:uFillTx/>
+                <a:latin typeface="Calibri" panose="020F0502020204030204" charset="0"/>
+                <a:ea typeface="楷体" panose="02010609060101010101" charset="-122"/>
+              </a:rPr>
+              <a:t>被调用者可以是任何可调用对象</a:t>
+            </a:r>
+            <a:r>
+              <a:rPr lang="zh-CN" altLang="en-US" b="1">
+                <a:solidFill>
+                  <a:schemeClr val="tx1"/>
+                </a:solidFill>
+                <a:uFillTx/>
+                <a:latin typeface="Calibri" panose="020F0502020204030204" charset="0"/>
+                <a:ea typeface="楷体" panose="02010609060101010101" charset="-122"/>
+              </a:rPr>
+              <a:t>。</a:t>
+            </a:r>
+            <a:r>
+              <a:rPr lang="zh-CN" altLang="en-US">
+                <a:solidFill>
+                  <a:schemeClr val="tx1"/>
+                </a:solidFill>
+                <a:uFillTx/>
+                <a:latin typeface="Calibri" panose="020F0502020204030204" charset="0"/>
+                <a:ea typeface="楷体" panose="02010609060101010101" charset="-122"/>
+              </a:rPr>
+              <a:t>在</a:t>
+            </a:r>
+            <a:r>
+              <a:rPr lang="zh-CN" altLang="en-US" b="1">
+                <a:solidFill>
+                  <a:schemeClr val="tx1"/>
+                </a:solidFill>
+                <a:uFillTx/>
+                <a:latin typeface="Calibri" panose="020F0502020204030204" charset="0"/>
+                <a:ea typeface="楷体" panose="02010609060101010101" charset="-122"/>
+              </a:rPr>
+              <a:t>相应条件触发</a:t>
+            </a:r>
+            <a:r>
+              <a:rPr lang="zh-CN" altLang="en-US">
+                <a:solidFill>
+                  <a:schemeClr val="tx1"/>
+                </a:solidFill>
+                <a:uFillTx/>
+                <a:latin typeface="Calibri" panose="020F0502020204030204" charset="0"/>
+                <a:ea typeface="楷体" panose="02010609060101010101" charset="-122"/>
+              </a:rPr>
+              <a:t>时</a:t>
+            </a:r>
+            <a:r>
+              <a:rPr lang="zh-CN" altLang="en-US" b="1">
+                <a:solidFill>
+                  <a:schemeClr val="tx1"/>
+                </a:solidFill>
+                <a:uFillTx/>
+                <a:latin typeface="Calibri" panose="020F0502020204030204" charset="0"/>
+                <a:ea typeface="楷体" panose="02010609060101010101" charset="-122"/>
+              </a:rPr>
+              <a:t>，以某种方法调用被调用者。</a:t>
+            </a:r>
+            <a:endParaRPr lang="zh-CN" altLang="en-US" b="1">
+              <a:solidFill>
+                <a:schemeClr val="tx1"/>
+              </a:solidFill>
+              <a:uFillTx/>
+              <a:latin typeface="Calibri" panose="020F0502020204030204" charset="0"/>
+              <a:ea typeface="楷体" panose="02010609060101010101" charset="-122"/>
+            </a:endParaRPr>
+          </a:p>
+          <a:p>
+            <a:endParaRPr lang="zh-CN" altLang="en-US" b="1">
+              <a:solidFill>
+                <a:schemeClr val="tx1"/>
+              </a:solidFill>
+              <a:uFillTx/>
+              <a:latin typeface="Calibri" panose="020F0502020204030204" charset="0"/>
+              <a:ea typeface="楷体" panose="02010609060101010101" charset="-122"/>
+            </a:endParaRPr>
+          </a:p>
+          <a:p>
+            <a:pPr marL="285750" indent="-285750">
+              <a:buFont typeface="Arial" panose="020B0604020202020204" pitchFamily="34" charset="0"/>
+              <a:buChar char="•"/>
+            </a:pPr>
+            <a:r>
+              <a:rPr lang="zh-CN" altLang="en-US" b="1">
+                <a:solidFill>
+                  <a:schemeClr val="tx1"/>
+                </a:solidFill>
+                <a:uFillTx/>
+                <a:latin typeface="Calibri" panose="020F0502020204030204" charset="0"/>
+                <a:ea typeface="楷体" panose="02010609060101010101" charset="-122"/>
+              </a:rPr>
+              <a:t>如何持有被调用者</a:t>
+            </a:r>
+            <a:endParaRPr lang="zh-CN" altLang="en-US" b="1">
+              <a:solidFill>
+                <a:schemeClr val="tx1"/>
+              </a:solidFill>
+              <a:uFillTx/>
+              <a:latin typeface="Calibri" panose="020F0502020204030204" charset="0"/>
+              <a:ea typeface="楷体" panose="02010609060101010101" charset="-122"/>
+            </a:endParaRPr>
+          </a:p>
+          <a:p>
+            <a:pPr marL="285750" indent="-285750">
+              <a:buFont typeface="Arial" panose="020B0604020202020204" pitchFamily="34" charset="0"/>
+              <a:buChar char="•"/>
+            </a:pPr>
+            <a:r>
+              <a:rPr lang="zh-CN" altLang="en-US" b="1">
+                <a:solidFill>
+                  <a:schemeClr val="tx1"/>
+                </a:solidFill>
+                <a:uFillTx/>
+                <a:latin typeface="Calibri" panose="020F0502020204030204" charset="0"/>
+                <a:ea typeface="楷体" panose="02010609060101010101" charset="-122"/>
+              </a:rPr>
+              <a:t>如何调用被调用者</a:t>
+            </a:r>
+            <a:endParaRPr lang="zh-CN" altLang="en-US" b="1">
+              <a:solidFill>
+                <a:schemeClr val="tx1"/>
+              </a:solidFill>
+              <a:uFillTx/>
+              <a:latin typeface="Calibri" panose="020F0502020204030204" charset="0"/>
+              <a:ea typeface="楷体" panose="02010609060101010101" charset="-122"/>
+            </a:endParaRPr>
+          </a:p>
+          <a:p>
+            <a:pPr marL="285750" indent="-285750">
+              <a:buFont typeface="Arial" panose="020B0604020202020204" pitchFamily="34" charset="0"/>
+              <a:buChar char="•"/>
+            </a:pPr>
+            <a:endParaRPr lang="zh-CN" altLang="en-US" b="1">
+              <a:solidFill>
+                <a:schemeClr val="tx1"/>
+              </a:solidFill>
+              <a:uFillTx/>
+              <a:latin typeface="Calibri" panose="020F0502020204030204" charset="0"/>
+              <a:ea typeface="楷体" panose="02010609060101010101" charset="-122"/>
+            </a:endParaRPr>
+          </a:p>
+          <a:p>
+            <a:pPr indent="0">
+              <a:buFont typeface="Arial" panose="020B0604020202020204" pitchFamily="34" charset="0"/>
+              <a:buNone/>
+            </a:pPr>
+            <a:r>
+              <a:rPr lang="zh-CN" altLang="en-US">
+                <a:solidFill>
+                  <a:schemeClr val="tx1"/>
+                </a:solidFill>
+                <a:uFillTx/>
+                <a:latin typeface="Calibri" panose="020F0502020204030204" charset="0"/>
+                <a:ea typeface="楷体" panose="02010609060101010101" charset="-122"/>
+              </a:rPr>
+              <a:t>调用者与被调用者不耦合，两者之间只按照某种相同的</a:t>
+            </a:r>
+            <a:r>
+              <a:rPr lang="zh-CN" altLang="en-US" b="1">
+                <a:solidFill>
+                  <a:schemeClr val="tx1"/>
+                </a:solidFill>
+                <a:uFillTx/>
+                <a:latin typeface="Calibri" panose="020F0502020204030204" charset="0"/>
+                <a:ea typeface="楷体" panose="02010609060101010101" charset="-122"/>
+              </a:rPr>
+              <a:t>调用规范，</a:t>
+            </a:r>
+            <a:r>
+              <a:rPr lang="zh-CN" altLang="en-US">
+                <a:solidFill>
+                  <a:schemeClr val="tx1"/>
+                </a:solidFill>
+                <a:uFillTx/>
+                <a:latin typeface="Calibri" panose="020F0502020204030204" charset="0"/>
+                <a:ea typeface="楷体" panose="02010609060101010101" charset="-122"/>
+              </a:rPr>
+              <a:t>由调用者</a:t>
+            </a:r>
+            <a:r>
+              <a:rPr lang="zh-CN" altLang="en-US" b="1">
+                <a:solidFill>
+                  <a:schemeClr val="tx1"/>
+                </a:solidFill>
+                <a:uFillTx/>
+                <a:latin typeface="Calibri" panose="020F0502020204030204" charset="0"/>
+                <a:ea typeface="楷体" panose="02010609060101010101" charset="-122"/>
+              </a:rPr>
+              <a:t>动态地</a:t>
+            </a:r>
+            <a:r>
+              <a:rPr lang="zh-CN" altLang="en-US">
+                <a:solidFill>
+                  <a:schemeClr val="tx1"/>
+                </a:solidFill>
+                <a:uFillTx/>
+                <a:latin typeface="Calibri" panose="020F0502020204030204" charset="0"/>
+                <a:ea typeface="楷体" panose="02010609060101010101" charset="-122"/>
+              </a:rPr>
+              <a:t>持有被调用者，并且向被调用者发起调用。</a:t>
+            </a:r>
+            <a:endParaRPr lang="zh-CN" altLang="en-US">
+              <a:solidFill>
+                <a:schemeClr val="tx1"/>
+              </a:solidFill>
+              <a:uFillTx/>
+              <a:latin typeface="Calibri" panose="020F0502020204030204" charset="0"/>
+              <a:ea typeface="楷体" panose="02010609060101010101" charset="-122"/>
+            </a:endParaRPr>
+          </a:p>
+          <a:p>
+            <a:pPr indent="0">
+              <a:buFont typeface="Arial" panose="020B0604020202020204" pitchFamily="34" charset="0"/>
+              <a:buNone/>
+            </a:pPr>
+            <a:endParaRPr lang="zh-CN" altLang="en-US">
+              <a:solidFill>
+                <a:schemeClr val="tx1"/>
+              </a:solidFill>
+              <a:uFillTx/>
+              <a:latin typeface="Calibri" panose="020F0502020204030204" charset="0"/>
+              <a:ea typeface="楷体" panose="02010609060101010101" charset="-122"/>
+            </a:endParaRPr>
+          </a:p>
+          <a:p>
+            <a:pPr indent="0">
+              <a:buFont typeface="Arial" panose="020B0604020202020204" pitchFamily="34" charset="0"/>
+              <a:buNone/>
+            </a:pPr>
+            <a:r>
+              <a:rPr lang="zh-CN" altLang="en-US">
+                <a:solidFill>
+                  <a:schemeClr val="tx1"/>
+                </a:solidFill>
+                <a:uFillTx/>
+                <a:latin typeface="Calibri" panose="020F0502020204030204" charset="0"/>
+                <a:ea typeface="楷体" panose="02010609060101010101" charset="-122"/>
+              </a:rPr>
+              <a:t>函数指针可以解耦调用者与被调用者，满足动态持有与动态动用。</a:t>
+            </a:r>
+            <a:endParaRPr lang="en-US" altLang="zh-CN">
+              <a:solidFill>
+                <a:schemeClr val="tx1"/>
+              </a:solidFill>
+              <a:uFillTx/>
+              <a:latin typeface="Calibri" panose="020F0502020204030204" charset="0"/>
+              <a:ea typeface="楷体" panose="02010609060101010101" charset="-122"/>
+            </a:endParaRPr>
           </a:p>
         </p:txBody>
       </p:sp>
     </p:spTree>
-    <p:extLst>
-      <p:ext uri="{BB962C8B-B14F-4D97-AF65-F5344CB8AC3E}">
-        <p14:creationId xmlns:p14="http://schemas.microsoft.com/office/powerpoint/2010/main" val="3813223953"/>
-      </p:ext>
-    </p:extLst>
   </p:cSld>
   <p:clrMapOvr>
     <a:masterClrMapping/>
@@ -4096,13 +3865,197 @@
       </p:grpSpPr>
       <p:sp>
         <p:nvSpPr>
-          <p:cNvPr id="4" name="文本框 3">
-            <a:extLst>
-              <a:ext uri="{FF2B5EF4-FFF2-40B4-BE49-F238E27FC236}">
-                <a16:creationId xmlns:a16="http://schemas.microsoft.com/office/drawing/2014/main" id="{CE9B96C8-4E84-D31B-C421-542729F150E5}"/>
-              </a:ext>
-            </a:extLst>
-          </p:cNvPr>
+          <p:cNvPr id="4" name="文本框 3"/>
+          <p:cNvSpPr txBox="1"/>
+          <p:nvPr/>
+        </p:nvSpPr>
+        <p:spPr>
+          <a:xfrm>
+            <a:off x="682283" y="682283"/>
+            <a:ext cx="10827434" cy="3939540"/>
+          </a:xfrm>
+          <a:prstGeom prst="rect">
+            <a:avLst/>
+          </a:prstGeom>
+          <a:noFill/>
+        </p:spPr>
+        <p:txBody>
+          <a:bodyPr wrap="square" rtlCol="0">
+            <a:spAutoFit/>
+          </a:bodyPr>
+          <a:lstStyle/>
+          <a:p>
+            <a:r>
+              <a:rPr lang="zh-CN" altLang="en-US" sz="2800" b="1" dirty="0"/>
+              <a:t>是什么？</a:t>
+            </a:r>
+            <a:endParaRPr lang="en-US" altLang="zh-CN" b="1" dirty="0"/>
+          </a:p>
+          <a:p>
+            <a:r>
+              <a:rPr lang="en-US" altLang="zh-CN" dirty="0"/>
+              <a:t>std::function </a:t>
+            </a:r>
+            <a:r>
+              <a:rPr lang="zh-CN" altLang="en-US" dirty="0"/>
+              <a:t>是一种通用，多态的函数封装，一种类型安全的包裹（相比，函数指针则是类型不安全的）。</a:t>
+            </a:r>
+            <a:endParaRPr lang="en-US" altLang="zh-CN" dirty="0"/>
+          </a:p>
+          <a:p>
+            <a:endParaRPr lang="en-US" altLang="zh-CN" dirty="0"/>
+          </a:p>
+          <a:p>
+            <a:r>
+              <a:rPr lang="zh-CN" altLang="en-US" sz="2800" b="1" dirty="0"/>
+              <a:t>做什么</a:t>
+            </a:r>
+            <a:endParaRPr lang="en-US" altLang="zh-CN" sz="2800" b="1" dirty="0"/>
+          </a:p>
+          <a:p>
+            <a:r>
+              <a:rPr lang="zh-CN" altLang="en-US" dirty="0"/>
+              <a:t>可以对任何</a:t>
+            </a:r>
+            <a:r>
+              <a:rPr lang="en-US" altLang="zh-CN" dirty="0"/>
+              <a:t>callable(</a:t>
+            </a:r>
+            <a:r>
+              <a:rPr lang="zh-CN" altLang="en-US" dirty="0"/>
+              <a:t>普通函数，</a:t>
+            </a:r>
+            <a:r>
+              <a:rPr lang="en-US" altLang="zh-CN" dirty="0"/>
+              <a:t>lambda</a:t>
+            </a:r>
+            <a:r>
+              <a:rPr lang="zh-CN" altLang="en-US" dirty="0"/>
+              <a:t>表达式，类对象</a:t>
+            </a:r>
+            <a:r>
+              <a:rPr lang="en-US" altLang="zh-CN" dirty="0"/>
+              <a:t>)</a:t>
+            </a:r>
+            <a:r>
+              <a:rPr lang="zh-CN" altLang="en-US" dirty="0"/>
+              <a:t>进行</a:t>
+            </a:r>
+            <a:r>
+              <a:rPr lang="zh-CN" altLang="en-US" b="1" dirty="0"/>
+              <a:t>存储，复制和调用</a:t>
+            </a:r>
+            <a:r>
+              <a:rPr lang="zh-CN" altLang="en-US" dirty="0"/>
+              <a:t>操作。</a:t>
+            </a:r>
+            <a:endParaRPr lang="en-US" altLang="zh-CN" sz="2800" b="1" dirty="0"/>
+          </a:p>
+          <a:p>
+            <a:r>
+              <a:rPr lang="zh-CN" altLang="en-US" dirty="0"/>
+              <a:t>最大的作用就是实现 </a:t>
+            </a:r>
+            <a:r>
+              <a:rPr lang="zh-CN" altLang="en-US" sz="2400" b="1" dirty="0"/>
+              <a:t>函数回调</a:t>
+            </a:r>
+            <a:r>
+              <a:rPr lang="zh-CN" altLang="en-US" sz="1600" b="1" dirty="0"/>
+              <a:t>（</a:t>
+            </a:r>
+            <a:r>
+              <a:rPr lang="zh-CN" altLang="en-US" sz="1600" dirty="0"/>
+              <a:t>即先存起来，使用时再用，做到延迟执行</a:t>
+            </a:r>
+            <a:r>
+              <a:rPr lang="zh-CN" altLang="en-US" sz="1600" b="1" dirty="0"/>
+              <a:t>）</a:t>
+            </a:r>
+            <a:endParaRPr lang="en-US" altLang="zh-CN" sz="2400" b="1" dirty="0"/>
+          </a:p>
+          <a:p>
+            <a:r>
+              <a:rPr lang="en-US" altLang="zh-CN" dirty="0"/>
+              <a:t>std::function </a:t>
+            </a:r>
+            <a:r>
+              <a:rPr lang="zh-CN" altLang="en-US" dirty="0"/>
+              <a:t>实现了一套类型消除机制，可以统一处理不同的函数对象类型</a:t>
+            </a:r>
+            <a:endParaRPr lang="en-US" altLang="zh-CN" sz="2000" dirty="0"/>
+          </a:p>
+          <a:p>
+            <a:endParaRPr lang="en-US" altLang="zh-CN" sz="2800" b="1" dirty="0"/>
+          </a:p>
+          <a:p>
+            <a:r>
+              <a:rPr lang="zh-CN" altLang="en-US" sz="2800" b="1" dirty="0"/>
+              <a:t>为什么？</a:t>
+            </a:r>
+            <a:endParaRPr lang="en-US" altLang="zh-CN" sz="2800" b="1" dirty="0"/>
+          </a:p>
+          <a:p>
+            <a:r>
+              <a:rPr lang="zh-CN" altLang="en-US" dirty="0"/>
+              <a:t>通过</a:t>
+            </a:r>
+            <a:r>
+              <a:rPr lang="en-US" altLang="zh-CN" dirty="0"/>
+              <a:t>std::function </a:t>
+            </a:r>
+            <a:r>
+              <a:rPr lang="zh-CN" altLang="en-US" dirty="0"/>
+              <a:t>对</a:t>
+            </a:r>
+            <a:r>
+              <a:rPr lang="en-US" altLang="zh-CN" dirty="0"/>
+              <a:t>C++</a:t>
+            </a:r>
+            <a:r>
+              <a:rPr lang="zh-CN" altLang="en-US" dirty="0"/>
+              <a:t>中各可调用实体的封装，形成一个新的可调用的</a:t>
+            </a:r>
+            <a:r>
+              <a:rPr lang="en-US" altLang="zh-CN" dirty="0"/>
+              <a:t>std::function</a:t>
+            </a:r>
+            <a:r>
+              <a:rPr lang="zh-CN" altLang="en-US" dirty="0"/>
+              <a:t>对象，让使用者不需要关心那么多的可调用实体。</a:t>
+            </a:r>
+            <a:endParaRPr lang="zh-CN" altLang="en-US" sz="2400" dirty="0"/>
+          </a:p>
+        </p:txBody>
+      </p:sp>
+    </p:spTree>
+  </p:cSld>
+  <p:clrMapOvr>
+    <a:masterClrMapping/>
+  </p:clrMapOvr>
+</p:sld>
+</file>
+
+<file path=ppt/slides/slide4.xml><?xml version="1.0" encoding="utf-8"?>
+<p:sld xmlns:a="http://schemas.openxmlformats.org/drawingml/2006/main" xmlns:r="http://schemas.openxmlformats.org/officeDocument/2006/relationships" xmlns:p="http://schemas.openxmlformats.org/presentationml/2006/main">
+  <p:cSld>
+    <p:spTree>
+      <p:nvGrpSpPr>
+        <p:cNvPr id="1" name=""/>
+        <p:cNvGrpSpPr/>
+        <p:nvPr/>
+      </p:nvGrpSpPr>
+      <p:grpSpPr>
+        <a:xfrm>
+          <a:off x="0" y="0"/>
+          <a:ext cx="0" cy="0"/>
+          <a:chOff x="0" y="0"/>
+          <a:chExt cx="0" cy="0"/>
+        </a:xfrm>
+      </p:grpSpPr>
+      <p:sp>
+        <p:nvSpPr>
+          <p:cNvPr id="4" name="文本框 3"/>
           <p:cNvSpPr txBox="1"/>
           <p:nvPr/>
         </p:nvSpPr>
@@ -4137,6 +4090,7 @@
               <a:rPr lang="en-US" altLang="zh-CN" dirty="0"/>
               <a:t>typedef void(*) ();</a:t>
             </a:r>
+            <a:endParaRPr lang="en-US" altLang="zh-CN" dirty="0"/>
           </a:p>
           <a:p>
             <a:pPr marL="285750" indent="-285750">
@@ -4153,13 +4107,7 @@
       </p:sp>
       <p:sp>
         <p:nvSpPr>
-          <p:cNvPr id="5" name="文本框 4">
-            <a:extLst>
-              <a:ext uri="{FF2B5EF4-FFF2-40B4-BE49-F238E27FC236}">
-                <a16:creationId xmlns:a16="http://schemas.microsoft.com/office/drawing/2014/main" id="{937F67A4-6F47-221B-5581-1E32F97B291E}"/>
-              </a:ext>
-            </a:extLst>
-          </p:cNvPr>
+          <p:cNvPr id="5" name="文本框 4"/>
           <p:cNvSpPr txBox="1"/>
           <p:nvPr/>
         </p:nvSpPr>
@@ -4232,13 +4180,7 @@
       </p:sp>
       <p:cxnSp>
         <p:nvCxnSpPr>
-          <p:cNvPr id="7" name="直接箭头连接符 6">
-            <a:extLst>
-              <a:ext uri="{FF2B5EF4-FFF2-40B4-BE49-F238E27FC236}">
-                <a16:creationId xmlns:a16="http://schemas.microsoft.com/office/drawing/2014/main" id="{35BF09E5-DBED-7647-39BF-47E6927F44FF}"/>
-              </a:ext>
-            </a:extLst>
-          </p:cNvPr>
+          <p:cNvPr id="7" name="直接箭头连接符 6"/>
           <p:cNvCxnSpPr/>
           <p:nvPr/>
         </p:nvCxnSpPr>
@@ -4271,13 +4213,7 @@
       </p:cxnSp>
       <p:sp>
         <p:nvSpPr>
-          <p:cNvPr id="8" name="文本框 7">
-            <a:extLst>
-              <a:ext uri="{FF2B5EF4-FFF2-40B4-BE49-F238E27FC236}">
-                <a16:creationId xmlns:a16="http://schemas.microsoft.com/office/drawing/2014/main" id="{3BD61BC6-D59B-AAC0-3050-9E0A08CD669D}"/>
-              </a:ext>
-            </a:extLst>
-          </p:cNvPr>
+          <p:cNvPr id="8" name="文本框 7"/>
           <p:cNvSpPr txBox="1"/>
           <p:nvPr/>
         </p:nvSpPr>
@@ -4313,138 +4249,6 @@
         </p:txBody>
       </p:sp>
     </p:spTree>
-    <p:extLst>
-      <p:ext uri="{BB962C8B-B14F-4D97-AF65-F5344CB8AC3E}">
-        <p14:creationId xmlns:p14="http://schemas.microsoft.com/office/powerpoint/2010/main" val="2999648769"/>
-      </p:ext>
-    </p:extLst>
-  </p:cSld>
-  <p:clrMapOvr>
-    <a:masterClrMapping/>
-  </p:clrMapOvr>
-</p:sld>
-</file>
-
-<file path=ppt/slides/slide4.xml><?xml version="1.0" encoding="utf-8"?>
-<p:sld xmlns:a="http://schemas.openxmlformats.org/drawingml/2006/main" xmlns:r="http://schemas.openxmlformats.org/officeDocument/2006/relationships" xmlns:p="http://schemas.openxmlformats.org/presentationml/2006/main">
-  <p:cSld>
-    <p:spTree>
-      <p:nvGrpSpPr>
-        <p:cNvPr id="1" name=""/>
-        <p:cNvGrpSpPr/>
-        <p:nvPr/>
-      </p:nvGrpSpPr>
-      <p:grpSpPr>
-        <a:xfrm>
-          <a:off x="0" y="0"/>
-          <a:ext cx="0" cy="0"/>
-          <a:chOff x="0" y="0"/>
-          <a:chExt cx="0" cy="0"/>
-        </a:xfrm>
-      </p:grpSpPr>
-      <p:sp>
-        <p:nvSpPr>
-          <p:cNvPr id="2" name="文本框 1">
-            <a:extLst>
-              <a:ext uri="{FF2B5EF4-FFF2-40B4-BE49-F238E27FC236}">
-                <a16:creationId xmlns:a16="http://schemas.microsoft.com/office/drawing/2014/main" id="{90550FBE-58F8-AAB9-2C73-2F47C784A6CB}"/>
-              </a:ext>
-            </a:extLst>
-          </p:cNvPr>
-          <p:cNvSpPr txBox="1"/>
-          <p:nvPr/>
-        </p:nvSpPr>
-        <p:spPr>
-          <a:xfrm>
-            <a:off x="1019908" y="752621"/>
-            <a:ext cx="10152184" cy="2308324"/>
-          </a:xfrm>
-          <a:prstGeom prst="rect">
-            <a:avLst/>
-          </a:prstGeom>
-          <a:noFill/>
-        </p:spPr>
-        <p:txBody>
-          <a:bodyPr wrap="square" rtlCol="0">
-            <a:spAutoFit/>
-          </a:bodyPr>
-          <a:lstStyle/>
-          <a:p>
-            <a:r>
-              <a:rPr lang="zh-CN" altLang="en-US" dirty="0"/>
-              <a:t>函数指针 </a:t>
-            </a:r>
-            <a:r>
-              <a:rPr lang="en-US" altLang="zh-CN" dirty="0"/>
-              <a:t>void (*)()</a:t>
-            </a:r>
-          </a:p>
-          <a:p>
-            <a:endParaRPr lang="en-US" altLang="zh-CN" dirty="0"/>
-          </a:p>
-          <a:p>
-            <a:r>
-              <a:rPr lang="en-US" altLang="zh-CN" dirty="0"/>
-              <a:t>C++</a:t>
-            </a:r>
-            <a:r>
-              <a:rPr lang="zh-CN" altLang="en-US" dirty="0"/>
-              <a:t>中函数指针应用比较广泛，</a:t>
-            </a:r>
-            <a:r>
-              <a:rPr lang="zh-CN" altLang="en-US" b="1" dirty="0"/>
-              <a:t>回调函数，接口类的设计，</a:t>
-            </a:r>
-            <a:r>
-              <a:rPr lang="zh-CN" altLang="en-US" dirty="0"/>
-              <a:t>但函数指针</a:t>
-            </a:r>
-            <a:r>
-              <a:rPr lang="zh-CN" altLang="en-US" b="1" dirty="0"/>
-              <a:t>只能指向全局或静态函数</a:t>
-            </a:r>
-            <a:r>
-              <a:rPr lang="zh-CN" altLang="en-US" dirty="0"/>
-              <a:t>。对于类的成员函数，</a:t>
-            </a:r>
-            <a:r>
-              <a:rPr lang="en-US" altLang="zh-CN" dirty="0"/>
-              <a:t>lambda</a:t>
-            </a:r>
-            <a:r>
-              <a:rPr lang="zh-CN" altLang="en-US"/>
-              <a:t>表达式和其他可调用对象无能为力。</a:t>
-            </a:r>
-            <a:endParaRPr lang="en-US" altLang="zh-CN" dirty="0"/>
-          </a:p>
-          <a:p>
-            <a:endParaRPr lang="en-US" altLang="zh-CN" dirty="0"/>
-          </a:p>
-          <a:p>
-            <a:endParaRPr lang="en-US" altLang="zh-CN" dirty="0"/>
-          </a:p>
-          <a:p>
-            <a:endParaRPr lang="en-US" altLang="zh-CN" dirty="0"/>
-          </a:p>
-          <a:p>
-            <a:r>
-              <a:rPr lang="en-US" altLang="zh-CN" dirty="0"/>
-              <a:t>typedef </a:t>
-            </a:r>
-            <a:r>
-              <a:rPr lang="zh-CN" altLang="en-US" dirty="0"/>
-              <a:t>的使用</a:t>
-            </a:r>
-            <a:endParaRPr lang="en-US" altLang="zh-CN" dirty="0"/>
-          </a:p>
-        </p:txBody>
-      </p:sp>
-    </p:spTree>
-    <p:extLst>
-      <p:ext uri="{BB962C8B-B14F-4D97-AF65-F5344CB8AC3E}">
-        <p14:creationId xmlns:p14="http://schemas.microsoft.com/office/powerpoint/2010/main" val="3734891947"/>
-      </p:ext>
-    </p:extLst>
   </p:cSld>
   <p:clrMapOvr>
     <a:masterClrMapping/>
@@ -4471,20 +4275,14 @@
       </p:grpSpPr>
       <p:sp>
         <p:nvSpPr>
-          <p:cNvPr id="2" name="文本框 1">
-            <a:extLst>
-              <a:ext uri="{FF2B5EF4-FFF2-40B4-BE49-F238E27FC236}">
-                <a16:creationId xmlns:a16="http://schemas.microsoft.com/office/drawing/2014/main" id="{3C6BB630-6490-B79C-BE8C-5E3165B57F79}"/>
-              </a:ext>
-            </a:extLst>
-          </p:cNvPr>
+          <p:cNvPr id="2" name="文本框 1"/>
           <p:cNvSpPr txBox="1"/>
           <p:nvPr/>
         </p:nvSpPr>
         <p:spPr>
           <a:xfrm>
-            <a:off x="591457" y="557795"/>
-            <a:ext cx="11009086" cy="369332"/>
+            <a:off x="1019908" y="752621"/>
+            <a:ext cx="10152184" cy="2308324"/>
           </a:xfrm>
           <a:prstGeom prst="rect">
             <a:avLst/>
@@ -4498,22 +4296,76 @@
           <a:lstStyle/>
           <a:p>
             <a:r>
+              <a:rPr lang="zh-CN" altLang="en-US" dirty="0"/>
+              <a:t>函数指针 </a:t>
+            </a:r>
+            <a:r>
               <a:rPr lang="en-US" altLang="zh-CN" dirty="0"/>
-              <a:t>C++ </a:t>
+              <a:t>void (*)()</a:t>
+            </a:r>
+            <a:endParaRPr lang="en-US" altLang="zh-CN" dirty="0"/>
+          </a:p>
+          <a:p>
+            <a:endParaRPr lang="en-US" altLang="zh-CN" dirty="0"/>
+          </a:p>
+          <a:p>
+            <a:r>
+              <a:rPr lang="en-US" altLang="zh-CN" dirty="0"/>
+              <a:t>C++</a:t>
             </a:r>
             <a:r>
               <a:rPr lang="zh-CN" altLang="en-US" dirty="0"/>
-              <a:t>虚函数</a:t>
-            </a:r>
+              <a:t>中函数指针应用比较广泛，</a:t>
+            </a:r>
+            <a:r>
+              <a:rPr lang="zh-CN" altLang="en-US" b="1" dirty="0"/>
+              <a:t>回调函数，接口类的设计，</a:t>
+            </a:r>
+            <a:r>
+              <a:rPr lang="zh-CN" altLang="en-US" dirty="0"/>
+              <a:t>但函数指针</a:t>
+            </a:r>
+            <a:r>
+              <a:rPr lang="zh-CN" altLang="en-US" b="1" dirty="0"/>
+              <a:t>只能指向全局或静态函数</a:t>
+            </a:r>
+            <a:r>
+              <a:rPr lang="zh-CN" altLang="en-US" dirty="0"/>
+              <a:t>。对于类的成员函数，</a:t>
+            </a:r>
+            <a:r>
+              <a:rPr lang="en-US" altLang="zh-CN" dirty="0"/>
+              <a:t>lambda</a:t>
+            </a:r>
+            <a:r>
+              <a:rPr lang="zh-CN" altLang="en-US"/>
+              <a:t>表达式和其他可调用对象无能为力。</a:t>
+            </a:r>
+            <a:endParaRPr lang="en-US" altLang="zh-CN" dirty="0"/>
+          </a:p>
+          <a:p>
+            <a:endParaRPr lang="en-US" altLang="zh-CN" dirty="0"/>
+          </a:p>
+          <a:p>
+            <a:endParaRPr lang="en-US" altLang="zh-CN" dirty="0"/>
+          </a:p>
+          <a:p>
+            <a:endParaRPr lang="en-US" altLang="zh-CN" dirty="0"/>
+          </a:p>
+          <a:p>
+            <a:r>
+              <a:rPr lang="en-US" altLang="zh-CN" dirty="0"/>
+              <a:t>typedef </a:t>
+            </a:r>
+            <a:r>
+              <a:rPr lang="zh-CN" altLang="en-US" dirty="0"/>
+              <a:t>的使用</a:t>
+            </a:r>
+            <a:endParaRPr lang="en-US" altLang="zh-CN" dirty="0"/>
           </a:p>
         </p:txBody>
       </p:sp>
     </p:spTree>
-    <p:extLst>
-      <p:ext uri="{BB962C8B-B14F-4D97-AF65-F5344CB8AC3E}">
-        <p14:creationId xmlns:p14="http://schemas.microsoft.com/office/powerpoint/2010/main" val="1737405040"/>
-      </p:ext>
-    </p:extLst>
   </p:cSld>
   <p:clrMapOvr>
     <a:masterClrMapping/>
@@ -4538,12 +4390,41 @@
           <a:chExt cx="0" cy="0"/>
         </a:xfrm>
       </p:grpSpPr>
+      <p:sp>
+        <p:nvSpPr>
+          <p:cNvPr id="2" name="文本框 1"/>
+          <p:cNvSpPr txBox="1"/>
+          <p:nvPr/>
+        </p:nvSpPr>
+        <p:spPr>
+          <a:xfrm>
+            <a:off x="591457" y="557795"/>
+            <a:ext cx="11009086" cy="369332"/>
+          </a:xfrm>
+          <a:prstGeom prst="rect">
+            <a:avLst/>
+          </a:prstGeom>
+          <a:noFill/>
+        </p:spPr>
+        <p:txBody>
+          <a:bodyPr wrap="square" rtlCol="0">
+            <a:spAutoFit/>
+          </a:bodyPr>
+          <a:lstStyle/>
+          <a:p>
+            <a:r>
+              <a:rPr lang="en-US" altLang="zh-CN" dirty="0"/>
+              <a:t>C++ </a:t>
+            </a:r>
+            <a:r>
+              <a:rPr lang="zh-CN" altLang="en-US" dirty="0"/>
+              <a:t>虚函数</a:t>
+            </a:r>
+            <a:endParaRPr lang="zh-CN" altLang="en-US" dirty="0"/>
+          </a:p>
+        </p:txBody>
+      </p:sp>
     </p:spTree>
-    <p:extLst>
-      <p:ext uri="{BB962C8B-B14F-4D97-AF65-F5344CB8AC3E}">
-        <p14:creationId xmlns:p14="http://schemas.microsoft.com/office/powerpoint/2010/main" val="4281210829"/>
-      </p:ext>
-    </p:extLst>
   </p:cSld>
   <p:clrMapOvr>
     <a:masterClrMapping/>
@@ -4569,11 +4450,6 @@
         </a:xfrm>
       </p:grpSpPr>
     </p:spTree>
-    <p:extLst>
-      <p:ext uri="{BB962C8B-B14F-4D97-AF65-F5344CB8AC3E}">
-        <p14:creationId xmlns:p14="http://schemas.microsoft.com/office/powerpoint/2010/main" val="211922605"/>
-      </p:ext>
-    </p:extLst>
   </p:cSld>
   <p:clrMapOvr>
     <a:masterClrMapping/>
@@ -4599,11 +4475,6 @@
         </a:xfrm>
       </p:grpSpPr>
     </p:spTree>
-    <p:extLst>
-      <p:ext uri="{BB962C8B-B14F-4D97-AF65-F5344CB8AC3E}">
-        <p14:creationId xmlns:p14="http://schemas.microsoft.com/office/powerpoint/2010/main" val="1509361955"/>
-      </p:ext>
-    </p:extLst>
   </p:cSld>
   <p:clrMapOvr>
     <a:masterClrMapping/>
@@ -4629,16 +4500,17 @@
         </a:xfrm>
       </p:grpSpPr>
     </p:spTree>
-    <p:extLst>
-      <p:ext uri="{BB962C8B-B14F-4D97-AF65-F5344CB8AC3E}">
-        <p14:creationId xmlns:p14="http://schemas.microsoft.com/office/powerpoint/2010/main" val="4261404653"/>
-      </p:ext>
-    </p:extLst>
   </p:cSld>
   <p:clrMapOvr>
     <a:masterClrMapping/>
   </p:clrMapOvr>
 </p:sld>
+</file>
+
+<file path=ppt/tags/tag1.xml><?xml version="1.0" encoding="utf-8"?>
+<p:tagLst xmlns:p="http://schemas.openxmlformats.org/presentationml/2006/main">
+  <p:tag name="COMMONDATA" val="eyJoZGlkIjoiODUyYWMzMjIwNjgwNGE3MzI5MDJiNjhjZmI3NmFhMjUifQ=="/>
+</p:tagLst>
 </file>
 
 <file path=ppt/theme/theme1.xml><?xml version="1.0" encoding="utf-8"?>
@@ -4684,7 +4556,7 @@
     </a:clrScheme>
     <a:fontScheme name="Office">
       <a:majorFont>
-        <a:latin typeface="等线 Light" panose="020F0302020204030204"/>
+        <a:latin typeface="等线 Light"/>
         <a:ea typeface=""/>
         <a:cs typeface=""/>
         <a:font script="Jpan" typeface="游ゴシック Light"/>
@@ -4717,26 +4589,9 @@
         <a:font script="Viet" typeface="Times New Roman"/>
         <a:font script="Uigh" typeface="Microsoft Uighur"/>
         <a:font script="Geor" typeface="Sylfaen"/>
-        <a:font script="Armn" typeface="Arial"/>
-        <a:font script="Bugi" typeface="Leelawadee UI"/>
-        <a:font script="Bopo" typeface="Microsoft JhengHei"/>
-        <a:font script="Java" typeface="Javanese Text"/>
-        <a:font script="Lisu" typeface="Segoe UI"/>
-        <a:font script="Mymr" typeface="Myanmar Text"/>
-        <a:font script="Nkoo" typeface="Ebrima"/>
-        <a:font script="Olck" typeface="Nirmala UI"/>
-        <a:font script="Osma" typeface="Ebrima"/>
-        <a:font script="Phag" typeface="Phagspa"/>
-        <a:font script="Syrn" typeface="Estrangelo Edessa"/>
-        <a:font script="Syrj" typeface="Estrangelo Edessa"/>
-        <a:font script="Syre" typeface="Estrangelo Edessa"/>
-        <a:font script="Sora" typeface="Nirmala UI"/>
-        <a:font script="Tale" typeface="Microsoft Tai Le"/>
-        <a:font script="Talu" typeface="Microsoft New Tai Lue"/>
-        <a:font script="Tfng" typeface="Ebrima"/>
       </a:majorFont>
       <a:minorFont>
-        <a:latin typeface="等线" panose="020F0502020204030204"/>
+        <a:latin typeface="等线"/>
         <a:ea typeface=""/>
         <a:cs typeface=""/>
         <a:font script="Jpan" typeface="游ゴシック"/>
@@ -4769,23 +4624,6 @@
         <a:font script="Viet" typeface="Arial"/>
         <a:font script="Uigh" typeface="Microsoft Uighur"/>
         <a:font script="Geor" typeface="Sylfaen"/>
-        <a:font script="Armn" typeface="Arial"/>
-        <a:font script="Bugi" typeface="Leelawadee UI"/>
-        <a:font script="Bopo" typeface="Microsoft JhengHei"/>
-        <a:font script="Java" typeface="Javanese Text"/>
-        <a:font script="Lisu" typeface="Segoe UI"/>
-        <a:font script="Mymr" typeface="Myanmar Text"/>
-        <a:font script="Nkoo" typeface="Ebrima"/>
-        <a:font script="Olck" typeface="Nirmala UI"/>
-        <a:font script="Osma" typeface="Ebrima"/>
-        <a:font script="Phag" typeface="Phagspa"/>
-        <a:font script="Syrn" typeface="Estrangelo Edessa"/>
-        <a:font script="Syrj" typeface="Estrangelo Edessa"/>
-        <a:font script="Syre" typeface="Estrangelo Edessa"/>
-        <a:font script="Sora" typeface="Nirmala UI"/>
-        <a:font script="Tale" typeface="Microsoft Tai Le"/>
-        <a:font script="Talu" typeface="Microsoft New Tai Lue"/>
-        <a:font script="Tfng" typeface="Ebrima"/>
       </a:minorFont>
     </a:fontScheme>
     <a:fmtScheme name="Office">
@@ -4926,8 +4764,28 @@
       </a:bgFillStyleLst>
     </a:fmtScheme>
   </a:themeElements>
-  <a:objectDefaults/>
-  <a:extraClrSchemeLst/>
+  <a:objectDefaults>
+    <a:txDef>
+      <a:spPr>
+        <a:noFill/>
+      </a:spPr>
+      <a:bodyPr wrap="none" rtlCol="0">
+        <a:spAutoFit/>
+      </a:bodyPr>
+      <a:lstStyle>
+        <a:defPPr>
+          <a:defRPr lang="en-US" altLang="zh-CN">
+            <a:solidFill>
+              <a:schemeClr val="tx1"/>
+            </a:solidFill>
+            <a:uFillTx/>
+            <a:latin typeface="Calibri" panose="020F0502020204030204" charset="0"/>
+            <a:ea typeface="楷体" panose="02010609060101010101" charset="-122"/>
+          </a:defRPr>
+        </a:defPPr>
+      </a:lstStyle>
+    </a:txDef>
+  </a:objectDefaults>
   <a:extLst>
     <a:ext uri="{05A4C25C-085E-4340-85A3-A5531E510DB2}">
       <thm15:themeFamily xmlns:thm15="http://schemas.microsoft.com/office/thememl/2012/main" name="Office Theme" id="{62F939B6-93AF-4DB8-9C6B-D6C7DFDC589F}" vid="{4A3C46E8-61CC-4603-A589-7422A47A8E4A}"/>
@@ -4979,7 +4837,7 @@
     </a:clrScheme>
     <a:fontScheme name="Office">
       <a:majorFont>
-        <a:latin typeface="等线 Light" panose="020F0302020204030204"/>
+        <a:latin typeface="等线 Light"/>
         <a:ea typeface=""/>
         <a:cs typeface=""/>
         <a:font script="Jpan" typeface="游ゴシック Light"/>
@@ -5012,26 +4870,9 @@
         <a:font script="Viet" typeface="Times New Roman"/>
         <a:font script="Uigh" typeface="Microsoft Uighur"/>
         <a:font script="Geor" typeface="Sylfaen"/>
-        <a:font script="Armn" typeface="Arial"/>
-        <a:font script="Bugi" typeface="Leelawadee UI"/>
-        <a:font script="Bopo" typeface="Microsoft JhengHei"/>
-        <a:font script="Java" typeface="Javanese Text"/>
-        <a:font script="Lisu" typeface="Segoe UI"/>
-        <a:font script="Mymr" typeface="Myanmar Text"/>
-        <a:font script="Nkoo" typeface="Ebrima"/>
-        <a:font script="Olck" typeface="Nirmala UI"/>
-        <a:font script="Osma" typeface="Ebrima"/>
-        <a:font script="Phag" typeface="Phagspa"/>
-        <a:font script="Syrn" typeface="Estrangelo Edessa"/>
-        <a:font script="Syrj" typeface="Estrangelo Edessa"/>
-        <a:font script="Syre" typeface="Estrangelo Edessa"/>
-        <a:font script="Sora" typeface="Nirmala UI"/>
-        <a:font script="Tale" typeface="Microsoft Tai Le"/>
-        <a:font script="Talu" typeface="Microsoft New Tai Lue"/>
-        <a:font script="Tfng" typeface="Ebrima"/>
       </a:majorFont>
       <a:minorFont>
-        <a:latin typeface="等线" panose="020F0502020204030204"/>
+        <a:latin typeface="等线"/>
         <a:ea typeface=""/>
         <a:cs typeface=""/>
         <a:font script="Jpan" typeface="游ゴシック"/>
@@ -5064,23 +4905,6 @@
         <a:font script="Viet" typeface="Arial"/>
         <a:font script="Uigh" typeface="Microsoft Uighur"/>
         <a:font script="Geor" typeface="Sylfaen"/>
-        <a:font script="Armn" typeface="Arial"/>
-        <a:font script="Bugi" typeface="Leelawadee UI"/>
-        <a:font script="Bopo" typeface="Microsoft JhengHei"/>
-        <a:font script="Java" typeface="Javanese Text"/>
-        <a:font script="Lisu" typeface="Segoe UI"/>
-        <a:font script="Mymr" typeface="Myanmar Text"/>
-        <a:font script="Nkoo" typeface="Ebrima"/>
-        <a:font script="Olck" typeface="Nirmala UI"/>
-        <a:font script="Osma" typeface="Ebrima"/>
-        <a:font script="Phag" typeface="Phagspa"/>
-        <a:font script="Syrn" typeface="Estrangelo Edessa"/>
-        <a:font script="Syrj" typeface="Estrangelo Edessa"/>
-        <a:font script="Syre" typeface="Estrangelo Edessa"/>
-        <a:font script="Sora" typeface="Nirmala UI"/>
-        <a:font script="Tale" typeface="Microsoft Tai Le"/>
-        <a:font script="Talu" typeface="Microsoft New Tai Lue"/>
-        <a:font script="Tfng" typeface="Ebrima"/>
       </a:minorFont>
     </a:fontScheme>
     <a:fmtScheme name="Office">
@@ -5221,8 +5045,6 @@
       </a:bgFillStyleLst>
     </a:fmtScheme>
   </a:themeElements>
-  <a:objectDefaults/>
-  <a:extraClrSchemeLst/>
   <a:extLst>
     <a:ext uri="{05A4C25C-085E-4340-85A3-A5531E510DB2}">
       <thm15:themeFamily xmlns:thm15="http://schemas.microsoft.com/office/thememl/2012/main" name="Office Theme" id="{62F939B6-93AF-4DB8-9C6B-D6C7DFDC589F}" vid="{4A3C46E8-61CC-4603-A589-7422A47A8E4A}"/>

</xml_diff>